<commit_message>
Java mini project donegit add .
</commit_message>
<xml_diff>
--- a/5_Java/Dasutflix/자료/JAVA프로젝트클래스다이어그램초안.pptx
+++ b/5_Java/Dasutflix/자료/JAVA프로젝트클래스다이어그램초안.pptx
@@ -107,6 +107,11 @@
       </a:defRPr>
     </a:lvl9pPr>
   </p:defaultTextStyle>
+  <p:extLst>
+    <p:ext uri="{EFAFB233-063F-42B5-8137-9DF3F51BA10A}">
+      <p15:sldGuideLst xmlns:p15="http://schemas.microsoft.com/office/powerpoint/2012/main"/>
+    </p:ext>
+  </p:extLst>
 </p:presentation>
 </file>
 
@@ -3463,7 +3468,7 @@
             <a:prstGeom prst="straightConnector1">
               <a:avLst/>
             </a:prstGeom>
-            <a:ln w="19050">
+            <a:ln w="28575">
               <a:tailEnd type="triangle"/>
             </a:ln>
           </p:spPr>
@@ -3590,7 +3595,7 @@
           <a:prstGeom prst="straightConnector1">
             <a:avLst/>
           </a:prstGeom>
-          <a:ln w="19050">
+          <a:ln w="28575">
             <a:tailEnd type="triangle"/>
           </a:ln>
         </p:spPr>
@@ -3681,7 +3686,7 @@
           <a:prstGeom prst="straightConnector1">
             <a:avLst/>
           </a:prstGeom>
-          <a:ln w="19050">
+          <a:ln w="28575">
             <a:tailEnd type="triangle"/>
           </a:ln>
         </p:spPr>
@@ -3772,7 +3777,7 @@
           <a:prstGeom prst="straightConnector1">
             <a:avLst/>
           </a:prstGeom>
-          <a:ln w="19050">
+          <a:ln w="28575">
             <a:tailEnd type="triangle"/>
           </a:ln>
         </p:spPr>
@@ -3841,10 +3846,10 @@
       </p:sp>
       <p:sp>
         <p:nvSpPr>
-          <p:cNvPr id="29" name="직사각형 28">
-            <a:extLst>
-              <a:ext uri="{FF2B5EF4-FFF2-40B4-BE49-F238E27FC236}">
-                <a16:creationId xmlns:a16="http://schemas.microsoft.com/office/drawing/2014/main" id="{413D92AE-3970-40F2-BC0D-36C52C5E987D}"/>
+          <p:cNvPr id="40" name="직사각형 39">
+            <a:extLst>
+              <a:ext uri="{FF2B5EF4-FFF2-40B4-BE49-F238E27FC236}">
+                <a16:creationId xmlns:a16="http://schemas.microsoft.com/office/drawing/2014/main" id="{C46DB13C-DF5E-4827-8D96-3BA324600A4A}"/>
               </a:ext>
             </a:extLst>
           </p:cNvPr>
@@ -3853,8 +3858,8 @@
         </p:nvSpPr>
         <p:spPr>
           <a:xfrm>
-            <a:off x="3663209" y="214661"/>
-            <a:ext cx="1879600" cy="552450"/>
+            <a:off x="7644709" y="4579422"/>
+            <a:ext cx="1295400" cy="546100"/>
           </a:xfrm>
           <a:prstGeom prst="rect">
             <a:avLst/>
@@ -3880,15 +3885,8 @@
           <a:p>
             <a:pPr algn="ctr"/>
             <a:r>
-              <a:rPr lang="en-US" altLang="ko-KR" dirty="0"/>
-              <a:t>&lt;&lt;Interface&gt;&gt;</a:t>
-            </a:r>
-          </a:p>
-          <a:p>
-            <a:pPr algn="ctr"/>
-            <a:r>
-              <a:rPr lang="en-US" altLang="ko-KR" dirty="0"/>
-              <a:t>Kids</a:t>
+              <a:rPr lang="en-US" altLang="ko-KR" dirty="0" err="1"/>
+              <a:t>PlayList</a:t>
             </a:r>
             <a:endParaRPr lang="ko-KR" altLang="en-US" dirty="0"/>
           </a:p>
@@ -3896,10 +3894,10 @@
       </p:sp>
       <p:sp>
         <p:nvSpPr>
-          <p:cNvPr id="30" name="직사각형 29">
-            <a:extLst>
-              <a:ext uri="{FF2B5EF4-FFF2-40B4-BE49-F238E27FC236}">
-                <a16:creationId xmlns:a16="http://schemas.microsoft.com/office/drawing/2014/main" id="{0926BBC1-C865-4A05-950A-CF3B4EDEA7CD}"/>
+          <p:cNvPr id="45" name="직사각형 44">
+            <a:extLst>
+              <a:ext uri="{FF2B5EF4-FFF2-40B4-BE49-F238E27FC236}">
+                <a16:creationId xmlns:a16="http://schemas.microsoft.com/office/drawing/2014/main" id="{F51D0976-86D2-4365-8E9A-57301F534053}"/>
               </a:ext>
             </a:extLst>
           </p:cNvPr>
@@ -3908,7 +3906,7 @@
         </p:nvSpPr>
         <p:spPr>
           <a:xfrm>
-            <a:off x="3663209" y="967424"/>
+            <a:off x="5943933" y="488950"/>
             <a:ext cx="1879600" cy="552450"/>
           </a:xfrm>
           <a:prstGeom prst="rect">
@@ -3935,26 +3933,62 @@
           <a:p>
             <a:pPr algn="ctr"/>
             <a:r>
-              <a:rPr lang="en-US" altLang="ko-KR" dirty="0"/>
-              <a:t>&lt;&lt;Interface&gt;&gt;</a:t>
-            </a:r>
-          </a:p>
-          <a:p>
-            <a:pPr algn="ctr"/>
-            <a:r>
-              <a:rPr lang="en-US" altLang="ko-KR" dirty="0"/>
-              <a:t>Adult</a:t>
+              <a:rPr lang="en-US" altLang="ko-KR" dirty="0" err="1"/>
+              <a:t>MenuViewer</a:t>
             </a:r>
             <a:endParaRPr lang="ko-KR" altLang="en-US" dirty="0"/>
           </a:p>
         </p:txBody>
       </p:sp>
-      <p:sp>
-        <p:nvSpPr>
-          <p:cNvPr id="40" name="직사각형 39">
-            <a:extLst>
-              <a:ext uri="{FF2B5EF4-FFF2-40B4-BE49-F238E27FC236}">
-                <a16:creationId xmlns:a16="http://schemas.microsoft.com/office/drawing/2014/main" id="{C46DB13C-DF5E-4827-8D96-3BA324600A4A}"/>
+      <p:cxnSp>
+        <p:nvCxnSpPr>
+          <p:cNvPr id="46" name="직선 화살표 연결선 45">
+            <a:extLst>
+              <a:ext uri="{FF2B5EF4-FFF2-40B4-BE49-F238E27FC236}">
+                <a16:creationId xmlns:a16="http://schemas.microsoft.com/office/drawing/2014/main" id="{48792A43-0FF9-4D58-9320-21093A2E5063}"/>
+              </a:ext>
+            </a:extLst>
+          </p:cNvPr>
+          <p:cNvCxnSpPr>
+            <a:cxnSpLocks/>
+            <a:stCxn id="16" idx="0"/>
+            <a:endCxn id="45" idx="2"/>
+          </p:cNvCxnSpPr>
+          <p:nvPr/>
+        </p:nvCxnSpPr>
+        <p:spPr>
+          <a:xfrm flipV="1">
+            <a:off x="6883733" y="1041400"/>
+            <a:ext cx="0" cy="685800"/>
+          </a:xfrm>
+          <a:prstGeom prst="straightConnector1">
+            <a:avLst/>
+          </a:prstGeom>
+          <a:ln w="28575">
+            <a:tailEnd type="triangle"/>
+          </a:ln>
+        </p:spPr>
+        <p:style>
+          <a:lnRef idx="1">
+            <a:schemeClr val="accent1"/>
+          </a:lnRef>
+          <a:fillRef idx="0">
+            <a:schemeClr val="accent1"/>
+          </a:fillRef>
+          <a:effectRef idx="0">
+            <a:schemeClr val="accent1"/>
+          </a:effectRef>
+          <a:fontRef idx="minor">
+            <a:schemeClr val="tx1"/>
+          </a:fontRef>
+        </p:style>
+      </p:cxnSp>
+      <p:sp>
+        <p:nvSpPr>
+          <p:cNvPr id="88" name="직사각형 87">
+            <a:extLst>
+              <a:ext uri="{FF2B5EF4-FFF2-40B4-BE49-F238E27FC236}">
+                <a16:creationId xmlns:a16="http://schemas.microsoft.com/office/drawing/2014/main" id="{1CEB4EC9-57AD-4C68-9B64-B523172AD491}"/>
               </a:ext>
             </a:extLst>
           </p:cNvPr>
@@ -3963,8 +3997,8 @@
         </p:nvSpPr>
         <p:spPr>
           <a:xfrm>
-            <a:off x="5975570" y="4593936"/>
-            <a:ext cx="1295400" cy="546100"/>
+            <a:off x="3955994" y="4115373"/>
+            <a:ext cx="1294030" cy="552450"/>
           </a:xfrm>
           <a:prstGeom prst="rect">
             <a:avLst/>
@@ -3990,19 +4024,62 @@
           <a:p>
             <a:pPr algn="ctr"/>
             <a:r>
-              <a:rPr lang="en-US" altLang="ko-KR" dirty="0" err="1"/>
-              <a:t>PlayList</a:t>
+              <a:rPr lang="en-US" altLang="ko-KR" dirty="0"/>
+              <a:t>Settings</a:t>
             </a:r>
             <a:endParaRPr lang="ko-KR" altLang="en-US" dirty="0"/>
           </a:p>
         </p:txBody>
       </p:sp>
-      <p:sp>
-        <p:nvSpPr>
-          <p:cNvPr id="45" name="직사각형 44">
-            <a:extLst>
-              <a:ext uri="{FF2B5EF4-FFF2-40B4-BE49-F238E27FC236}">
-                <a16:creationId xmlns:a16="http://schemas.microsoft.com/office/drawing/2014/main" id="{F51D0976-86D2-4365-8E9A-57301F534053}"/>
+      <p:cxnSp>
+        <p:nvCxnSpPr>
+          <p:cNvPr id="89" name="직선 화살표 연결선 88">
+            <a:extLst>
+              <a:ext uri="{FF2B5EF4-FFF2-40B4-BE49-F238E27FC236}">
+                <a16:creationId xmlns:a16="http://schemas.microsoft.com/office/drawing/2014/main" id="{58DB6110-4E14-4422-AC74-558F80A2C0D8}"/>
+              </a:ext>
+            </a:extLst>
+          </p:cNvPr>
+          <p:cNvCxnSpPr>
+            <a:cxnSpLocks/>
+            <a:stCxn id="99" idx="2"/>
+            <a:endCxn id="88" idx="0"/>
+          </p:cNvCxnSpPr>
+          <p:nvPr/>
+        </p:nvCxnSpPr>
+        <p:spPr>
+          <a:xfrm>
+            <a:off x="4603009" y="3619500"/>
+            <a:ext cx="0" cy="495873"/>
+          </a:xfrm>
+          <a:prstGeom prst="straightConnector1">
+            <a:avLst/>
+          </a:prstGeom>
+          <a:ln w="28575">
+            <a:tailEnd type="triangle"/>
+          </a:ln>
+        </p:spPr>
+        <p:style>
+          <a:lnRef idx="1">
+            <a:schemeClr val="accent1"/>
+          </a:lnRef>
+          <a:fillRef idx="0">
+            <a:schemeClr val="accent1"/>
+          </a:fillRef>
+          <a:effectRef idx="0">
+            <a:schemeClr val="accent1"/>
+          </a:effectRef>
+          <a:fontRef idx="minor">
+            <a:schemeClr val="tx1"/>
+          </a:fontRef>
+        </p:style>
+      </p:cxnSp>
+      <p:sp>
+        <p:nvSpPr>
+          <p:cNvPr id="92" name="직사각형 91">
+            <a:extLst>
+              <a:ext uri="{FF2B5EF4-FFF2-40B4-BE49-F238E27FC236}">
+                <a16:creationId xmlns:a16="http://schemas.microsoft.com/office/drawing/2014/main" id="{38B9985D-FC1F-4906-8C1A-CF74B11ABBC1}"/>
               </a:ext>
             </a:extLst>
           </p:cNvPr>
@@ -4011,7 +4088,7 @@
         </p:nvSpPr>
         <p:spPr>
           <a:xfrm>
-            <a:off x="5943933" y="488950"/>
+            <a:off x="8240571" y="495300"/>
             <a:ext cx="1879600" cy="552450"/>
           </a:xfrm>
           <a:prstGeom prst="rect">
@@ -4038,8 +4115,15 @@
           <a:p>
             <a:pPr algn="ctr"/>
             <a:r>
+              <a:rPr lang="en-US" altLang="ko-KR" dirty="0"/>
+              <a:t>&lt;&lt;Interface&gt;&gt;</a:t>
+            </a:r>
+          </a:p>
+          <a:p>
+            <a:pPr algn="ctr"/>
+            <a:r>
               <a:rPr lang="en-US" altLang="ko-KR" dirty="0" err="1"/>
-              <a:t>MenuViewer</a:t>
+              <a:t>MenuSelector</a:t>
             </a:r>
             <a:endParaRPr lang="ko-KR" altLang="en-US" dirty="0"/>
           </a:p>
@@ -4047,29 +4131,29 @@
       </p:sp>
       <p:cxnSp>
         <p:nvCxnSpPr>
-          <p:cNvPr id="46" name="직선 화살표 연결선 45">
-            <a:extLst>
-              <a:ext uri="{FF2B5EF4-FFF2-40B4-BE49-F238E27FC236}">
-                <a16:creationId xmlns:a16="http://schemas.microsoft.com/office/drawing/2014/main" id="{48792A43-0FF9-4D58-9320-21093A2E5063}"/>
+          <p:cNvPr id="93" name="직선 화살표 연결선 92">
+            <a:extLst>
+              <a:ext uri="{FF2B5EF4-FFF2-40B4-BE49-F238E27FC236}">
+                <a16:creationId xmlns:a16="http://schemas.microsoft.com/office/drawing/2014/main" id="{D2DCEC7A-D60F-4F37-803F-ABAC23FA6B97}"/>
               </a:ext>
             </a:extLst>
           </p:cNvPr>
           <p:cNvCxnSpPr>
             <a:cxnSpLocks/>
-            <a:stCxn id="16" idx="0"/>
-            <a:endCxn id="45" idx="2"/>
+            <a:stCxn id="45" idx="3"/>
+            <a:endCxn id="92" idx="1"/>
           </p:cNvCxnSpPr>
           <p:nvPr/>
         </p:nvCxnSpPr>
         <p:spPr>
-          <a:xfrm flipV="1">
-            <a:off x="6883733" y="1041400"/>
-            <a:ext cx="0" cy="685800"/>
+          <a:xfrm>
+            <a:off x="7823533" y="765175"/>
+            <a:ext cx="417038" cy="6350"/>
           </a:xfrm>
           <a:prstGeom prst="straightConnector1">
             <a:avLst/>
           </a:prstGeom>
-          <a:ln w="19050">
+          <a:ln w="28575">
             <a:tailEnd type="triangle"/>
           </a:ln>
         </p:spPr>
@@ -4088,98 +4172,12 @@
           </a:fontRef>
         </p:style>
       </p:cxnSp>
-      <p:cxnSp>
-        <p:nvCxnSpPr>
-          <p:cNvPr id="53" name="직선 화살표 연결선 52">
-            <a:extLst>
-              <a:ext uri="{FF2B5EF4-FFF2-40B4-BE49-F238E27FC236}">
-                <a16:creationId xmlns:a16="http://schemas.microsoft.com/office/drawing/2014/main" id="{5F115C76-52B1-4C2D-85DB-3D9D9DB5DDBD}"/>
-              </a:ext>
-            </a:extLst>
-          </p:cNvPr>
-          <p:cNvCxnSpPr>
-            <a:cxnSpLocks/>
-            <a:stCxn id="4" idx="3"/>
-            <a:endCxn id="29" idx="1"/>
-          </p:cNvCxnSpPr>
-          <p:nvPr/>
-        </p:nvCxnSpPr>
-        <p:spPr>
-          <a:xfrm flipV="1">
-            <a:off x="3092543" y="490886"/>
-            <a:ext cx="570666" cy="1509364"/>
-          </a:xfrm>
-          <a:prstGeom prst="straightConnector1">
-            <a:avLst/>
-          </a:prstGeom>
-          <a:ln w="19050">
-            <a:tailEnd type="triangle"/>
-          </a:ln>
-        </p:spPr>
-        <p:style>
-          <a:lnRef idx="1">
-            <a:schemeClr val="accent1"/>
-          </a:lnRef>
-          <a:fillRef idx="0">
-            <a:schemeClr val="accent1"/>
-          </a:fillRef>
-          <a:effectRef idx="0">
-            <a:schemeClr val="accent1"/>
-          </a:effectRef>
-          <a:fontRef idx="minor">
-            <a:schemeClr val="tx1"/>
-          </a:fontRef>
-        </p:style>
-      </p:cxnSp>
-      <p:cxnSp>
-        <p:nvCxnSpPr>
-          <p:cNvPr id="56" name="직선 화살표 연결선 55">
-            <a:extLst>
-              <a:ext uri="{FF2B5EF4-FFF2-40B4-BE49-F238E27FC236}">
-                <a16:creationId xmlns:a16="http://schemas.microsoft.com/office/drawing/2014/main" id="{8248122F-AE34-4CFB-A3DC-7ABEFB242F61}"/>
-              </a:ext>
-            </a:extLst>
-          </p:cNvPr>
-          <p:cNvCxnSpPr>
-            <a:cxnSpLocks/>
-            <a:stCxn id="4" idx="3"/>
-            <a:endCxn id="30" idx="1"/>
-          </p:cNvCxnSpPr>
-          <p:nvPr/>
-        </p:nvCxnSpPr>
-        <p:spPr>
-          <a:xfrm flipV="1">
-            <a:off x="3092543" y="1243649"/>
-            <a:ext cx="570666" cy="756601"/>
-          </a:xfrm>
-          <a:prstGeom prst="straightConnector1">
-            <a:avLst/>
-          </a:prstGeom>
-          <a:ln w="19050">
-            <a:tailEnd type="triangle"/>
-          </a:ln>
-        </p:spPr>
-        <p:style>
-          <a:lnRef idx="1">
-            <a:schemeClr val="accent1"/>
-          </a:lnRef>
-          <a:fillRef idx="0">
-            <a:schemeClr val="accent1"/>
-          </a:fillRef>
-          <a:effectRef idx="0">
-            <a:schemeClr val="accent1"/>
-          </a:effectRef>
-          <a:fontRef idx="minor">
-            <a:schemeClr val="tx1"/>
-          </a:fontRef>
-        </p:style>
-      </p:cxnSp>
-      <p:sp>
-        <p:nvSpPr>
-          <p:cNvPr id="59" name="직사각형 58">
-            <a:extLst>
-              <a:ext uri="{FF2B5EF4-FFF2-40B4-BE49-F238E27FC236}">
-                <a16:creationId xmlns:a16="http://schemas.microsoft.com/office/drawing/2014/main" id="{03DDA9B2-A575-472D-B437-60D6B2A86156}"/>
+      <p:sp>
+        <p:nvSpPr>
+          <p:cNvPr id="99" name="직사각형 98">
+            <a:extLst>
+              <a:ext uri="{FF2B5EF4-FFF2-40B4-BE49-F238E27FC236}">
+                <a16:creationId xmlns:a16="http://schemas.microsoft.com/office/drawing/2014/main" id="{E7FEC1D6-2913-4EA4-AB83-10A13A26EE9E}"/>
               </a:ext>
             </a:extLst>
           </p:cNvPr>
@@ -4188,7 +4186,7 @@
         </p:nvSpPr>
         <p:spPr>
           <a:xfrm>
-            <a:off x="8165525" y="4146261"/>
+            <a:off x="3663209" y="3067050"/>
             <a:ext cx="1879600" cy="552450"/>
           </a:xfrm>
           <a:prstGeom prst="rect">
@@ -4215,26 +4213,148 @@
           <a:p>
             <a:pPr algn="ctr"/>
             <a:r>
-              <a:rPr lang="en-US" altLang="ko-KR" dirty="0"/>
-              <a:t>&lt;&lt;Interface&gt;&gt;</a:t>
-            </a:r>
-          </a:p>
-          <a:p>
-            <a:pPr algn="ctr"/>
-            <a:r>
               <a:rPr lang="en-US" altLang="ko-KR" dirty="0" err="1"/>
-              <a:t>KidsMovies</a:t>
-            </a:r>
-            <a:endParaRPr lang="ko-KR" altLang="en-US" dirty="0"/>
-          </a:p>
-        </p:txBody>
-      </p:sp>
-      <p:sp>
-        <p:nvSpPr>
-          <p:cNvPr id="61" name="직사각형 60">
-            <a:extLst>
-              <a:ext uri="{FF2B5EF4-FFF2-40B4-BE49-F238E27FC236}">
-                <a16:creationId xmlns:a16="http://schemas.microsoft.com/office/drawing/2014/main" id="{57E869AB-0608-4A0A-9C98-3CA935F14374}"/>
+              <a:t>AdminManager</a:t>
+            </a:r>
+            <a:endParaRPr lang="en-US" altLang="ko-KR" dirty="0"/>
+          </a:p>
+        </p:txBody>
+      </p:sp>
+      <p:cxnSp>
+        <p:nvCxnSpPr>
+          <p:cNvPr id="100" name="직선 화살표 연결선 99">
+            <a:extLst>
+              <a:ext uri="{FF2B5EF4-FFF2-40B4-BE49-F238E27FC236}">
+                <a16:creationId xmlns:a16="http://schemas.microsoft.com/office/drawing/2014/main" id="{6C75CDAA-7560-4D87-813A-159C7313DE4D}"/>
+              </a:ext>
+            </a:extLst>
+          </p:cNvPr>
+          <p:cNvCxnSpPr>
+            <a:cxnSpLocks/>
+            <a:stCxn id="99" idx="1"/>
+            <a:endCxn id="6" idx="3"/>
+          </p:cNvCxnSpPr>
+          <p:nvPr/>
+        </p:nvCxnSpPr>
+        <p:spPr>
+          <a:xfrm flipH="1">
+            <a:off x="3092543" y="3343275"/>
+            <a:ext cx="570666" cy="3175"/>
+          </a:xfrm>
+          <a:prstGeom prst="straightConnector1">
+            <a:avLst/>
+          </a:prstGeom>
+          <a:ln w="28575">
+            <a:tailEnd type="triangle"/>
+          </a:ln>
+        </p:spPr>
+        <p:style>
+          <a:lnRef idx="1">
+            <a:schemeClr val="accent1"/>
+          </a:lnRef>
+          <a:fillRef idx="0">
+            <a:schemeClr val="accent1"/>
+          </a:fillRef>
+          <a:effectRef idx="0">
+            <a:schemeClr val="accent1"/>
+          </a:effectRef>
+          <a:fontRef idx="minor">
+            <a:schemeClr val="tx1"/>
+          </a:fontRef>
+        </p:style>
+      </p:cxnSp>
+      <p:cxnSp>
+        <p:nvCxnSpPr>
+          <p:cNvPr id="106" name="직선 화살표 연결선 105">
+            <a:extLst>
+              <a:ext uri="{FF2B5EF4-FFF2-40B4-BE49-F238E27FC236}">
+                <a16:creationId xmlns:a16="http://schemas.microsoft.com/office/drawing/2014/main" id="{E5871BE4-DB20-473C-A9AC-5757131CD5F4}"/>
+              </a:ext>
+            </a:extLst>
+          </p:cNvPr>
+          <p:cNvCxnSpPr>
+            <a:cxnSpLocks/>
+            <a:stCxn id="99" idx="3"/>
+            <a:endCxn id="22" idx="1"/>
+          </p:cNvCxnSpPr>
+          <p:nvPr/>
+        </p:nvCxnSpPr>
+        <p:spPr>
+          <a:xfrm>
+            <a:off x="5542809" y="3343275"/>
+            <a:ext cx="401124" cy="868"/>
+          </a:xfrm>
+          <a:prstGeom prst="straightConnector1">
+            <a:avLst/>
+          </a:prstGeom>
+          <a:ln w="28575">
+            <a:tailEnd type="triangle"/>
+          </a:ln>
+        </p:spPr>
+        <p:style>
+          <a:lnRef idx="1">
+            <a:schemeClr val="accent1"/>
+          </a:lnRef>
+          <a:fillRef idx="0">
+            <a:schemeClr val="accent1"/>
+          </a:fillRef>
+          <a:effectRef idx="0">
+            <a:schemeClr val="accent1"/>
+          </a:effectRef>
+          <a:fontRef idx="minor">
+            <a:schemeClr val="tx1"/>
+          </a:fontRef>
+        </p:style>
+      </p:cxnSp>
+      <p:cxnSp>
+        <p:nvCxnSpPr>
+          <p:cNvPr id="110" name="직선 화살표 연결선 109">
+            <a:extLst>
+              <a:ext uri="{FF2B5EF4-FFF2-40B4-BE49-F238E27FC236}">
+                <a16:creationId xmlns:a16="http://schemas.microsoft.com/office/drawing/2014/main" id="{6ABE6C38-F118-40A2-BEB8-17C232BBC479}"/>
+              </a:ext>
+            </a:extLst>
+          </p:cNvPr>
+          <p:cNvCxnSpPr>
+            <a:cxnSpLocks/>
+            <a:stCxn id="16" idx="2"/>
+            <a:endCxn id="22" idx="0"/>
+          </p:cNvCxnSpPr>
+          <p:nvPr/>
+        </p:nvCxnSpPr>
+        <p:spPr>
+          <a:xfrm>
+            <a:off x="6883733" y="2279650"/>
+            <a:ext cx="0" cy="788268"/>
+          </a:xfrm>
+          <a:prstGeom prst="straightConnector1">
+            <a:avLst/>
+          </a:prstGeom>
+          <a:ln w="28575">
+            <a:tailEnd type="triangle"/>
+          </a:ln>
+        </p:spPr>
+        <p:style>
+          <a:lnRef idx="1">
+            <a:schemeClr val="accent1"/>
+          </a:lnRef>
+          <a:fillRef idx="0">
+            <a:schemeClr val="accent1"/>
+          </a:fillRef>
+          <a:effectRef idx="0">
+            <a:schemeClr val="accent1"/>
+          </a:effectRef>
+          <a:fontRef idx="minor">
+            <a:schemeClr val="tx1"/>
+          </a:fontRef>
+        </p:style>
+      </p:cxnSp>
+      <p:sp>
+        <p:nvSpPr>
+          <p:cNvPr id="118" name="직사각형 117">
+            <a:extLst>
+              <a:ext uri="{FF2B5EF4-FFF2-40B4-BE49-F238E27FC236}">
+                <a16:creationId xmlns:a16="http://schemas.microsoft.com/office/drawing/2014/main" id="{02255A0F-2C73-48A5-B2FE-107405E59D68}"/>
               </a:ext>
             </a:extLst>
           </p:cNvPr>
@@ -4243,8 +4363,8 @@
         </p:nvSpPr>
         <p:spPr>
           <a:xfrm>
-            <a:off x="8165525" y="5224604"/>
-            <a:ext cx="1879600" cy="552450"/>
+            <a:off x="7954409" y="5929663"/>
+            <a:ext cx="1539701" cy="546100"/>
           </a:xfrm>
           <a:prstGeom prst="rect">
             <a:avLst/>
@@ -4270,15 +4390,8 @@
           <a:p>
             <a:pPr algn="ctr"/>
             <a:r>
-              <a:rPr lang="en-US" altLang="ko-KR" dirty="0"/>
-              <a:t>&lt;&lt;Interface&gt;&gt;</a:t>
-            </a:r>
-          </a:p>
-          <a:p>
-            <a:pPr algn="ctr"/>
-            <a:r>
               <a:rPr lang="en-US" altLang="ko-KR" dirty="0" err="1"/>
-              <a:t>AdultMovies</a:t>
+              <a:t>RecommendList</a:t>
             </a:r>
             <a:endParaRPr lang="ko-KR" altLang="en-US" dirty="0"/>
           </a:p>
@@ -4286,29 +4399,29 @@
       </p:sp>
       <p:cxnSp>
         <p:nvCxnSpPr>
-          <p:cNvPr id="62" name="직선 화살표 연결선 61">
-            <a:extLst>
-              <a:ext uri="{FF2B5EF4-FFF2-40B4-BE49-F238E27FC236}">
-                <a16:creationId xmlns:a16="http://schemas.microsoft.com/office/drawing/2014/main" id="{D08DDC62-A5C3-4D78-A000-D9C9F514D552}"/>
+          <p:cNvPr id="119" name="직선 화살표 연결선 118">
+            <a:extLst>
+              <a:ext uri="{FF2B5EF4-FFF2-40B4-BE49-F238E27FC236}">
+                <a16:creationId xmlns:a16="http://schemas.microsoft.com/office/drawing/2014/main" id="{0F3BB7E7-2A31-4958-8B25-24D1E7C4F0D9}"/>
               </a:ext>
             </a:extLst>
           </p:cNvPr>
           <p:cNvCxnSpPr>
             <a:cxnSpLocks/>
-            <a:stCxn id="59" idx="0"/>
-            <a:endCxn id="21" idx="2"/>
+            <a:stCxn id="118" idx="0"/>
+            <a:endCxn id="40" idx="2"/>
           </p:cNvCxnSpPr>
           <p:nvPr/>
         </p:nvCxnSpPr>
         <p:spPr>
-          <a:xfrm flipV="1">
-            <a:off x="9105325" y="3620368"/>
-            <a:ext cx="0" cy="525893"/>
+          <a:xfrm flipH="1" flipV="1">
+            <a:off x="8292409" y="5125522"/>
+            <a:ext cx="431851" cy="804141"/>
           </a:xfrm>
           <a:prstGeom prst="straightConnector1">
             <a:avLst/>
           </a:prstGeom>
-          <a:ln w="19050">
+          <a:ln w="28575">
             <a:tailEnd type="triangle"/>
           </a:ln>
         </p:spPr>
@@ -4327,55 +4440,47 @@
           </a:fontRef>
         </p:style>
       </p:cxnSp>
-      <p:cxnSp>
-        <p:nvCxnSpPr>
-          <p:cNvPr id="65" name="직선 화살표 연결선 64">
-            <a:extLst>
-              <a:ext uri="{FF2B5EF4-FFF2-40B4-BE49-F238E27FC236}">
-                <a16:creationId xmlns:a16="http://schemas.microsoft.com/office/drawing/2014/main" id="{C65D0D7A-B12F-4F31-AE89-CB1471CDA9D1}"/>
-              </a:ext>
-            </a:extLst>
-          </p:cNvPr>
-          <p:cNvCxnSpPr>
-            <a:cxnSpLocks/>
-            <a:stCxn id="61" idx="0"/>
-            <a:endCxn id="59" idx="2"/>
-          </p:cNvCxnSpPr>
-          <p:nvPr/>
-        </p:nvCxnSpPr>
-        <p:spPr>
-          <a:xfrm flipV="1">
-            <a:off x="9105325" y="4698711"/>
-            <a:ext cx="0" cy="525893"/>
-          </a:xfrm>
-          <a:prstGeom prst="straightConnector1">
-            <a:avLst/>
-          </a:prstGeom>
-          <a:ln w="19050">
-            <a:tailEnd type="triangle"/>
-          </a:ln>
-        </p:spPr>
-        <p:style>
-          <a:lnRef idx="1">
-            <a:schemeClr val="accent1"/>
-          </a:lnRef>
-          <a:fillRef idx="0">
-            <a:schemeClr val="accent1"/>
-          </a:fillRef>
-          <a:effectRef idx="0">
-            <a:schemeClr val="accent1"/>
-          </a:effectRef>
-          <a:fontRef idx="minor">
-            <a:schemeClr val="tx1"/>
-          </a:fontRef>
-        </p:style>
-      </p:cxnSp>
-      <p:sp>
-        <p:nvSpPr>
-          <p:cNvPr id="88" name="직사각형 87">
-            <a:extLst>
-              <a:ext uri="{FF2B5EF4-FFF2-40B4-BE49-F238E27FC236}">
-                <a16:creationId xmlns:a16="http://schemas.microsoft.com/office/drawing/2014/main" id="{1CEB4EC9-57AD-4C68-9B64-B523172AD491}"/>
+      <p:sp>
+        <p:nvSpPr>
+          <p:cNvPr id="127" name="TextBox 126">
+            <a:extLst>
+              <a:ext uri="{FF2B5EF4-FFF2-40B4-BE49-F238E27FC236}">
+                <a16:creationId xmlns:a16="http://schemas.microsoft.com/office/drawing/2014/main" id="{41EC149D-E463-4C98-BEA8-C275C85778C2}"/>
+              </a:ext>
+            </a:extLst>
+          </p:cNvPr>
+          <p:cNvSpPr txBox="1"/>
+          <p:nvPr/>
+        </p:nvSpPr>
+        <p:spPr>
+          <a:xfrm>
+            <a:off x="8592985" y="5383563"/>
+            <a:ext cx="646331" cy="369332"/>
+          </a:xfrm>
+          <a:prstGeom prst="rect">
+            <a:avLst/>
+          </a:prstGeom>
+          <a:noFill/>
+        </p:spPr>
+        <p:txBody>
+          <a:bodyPr wrap="none" rtlCol="0">
+            <a:spAutoFit/>
+          </a:bodyPr>
+          <a:lstStyle/>
+          <a:p>
+            <a:r>
+              <a:rPr lang="ko-KR" altLang="en-US" dirty="0"/>
+              <a:t>상속</a:t>
+            </a:r>
+          </a:p>
+        </p:txBody>
+      </p:sp>
+      <p:sp>
+        <p:nvSpPr>
+          <p:cNvPr id="128" name="직사각형 127">
+            <a:extLst>
+              <a:ext uri="{FF2B5EF4-FFF2-40B4-BE49-F238E27FC236}">
+                <a16:creationId xmlns:a16="http://schemas.microsoft.com/office/drawing/2014/main" id="{12A0F47B-4187-49E6-B963-6792B3C6FE44}"/>
               </a:ext>
             </a:extLst>
           </p:cNvPr>
@@ -4384,8 +4489,8 @@
         </p:nvSpPr>
         <p:spPr>
           <a:xfrm>
-            <a:off x="3955994" y="4115373"/>
-            <a:ext cx="1294030" cy="552450"/>
+            <a:off x="6502615" y="5929086"/>
+            <a:ext cx="1198417" cy="546100"/>
           </a:xfrm>
           <a:prstGeom prst="rect">
             <a:avLst/>
@@ -4411,8 +4516,8 @@
           <a:p>
             <a:pPr algn="ctr"/>
             <a:r>
-              <a:rPr lang="en-US" altLang="ko-KR" dirty="0"/>
-              <a:t>Settings</a:t>
+              <a:rPr lang="en-US" altLang="ko-KR" dirty="0" err="1"/>
+              <a:t>MyList</a:t>
             </a:r>
             <a:endParaRPr lang="ko-KR" altLang="en-US" dirty="0"/>
           </a:p>
@@ -4420,29 +4525,29 @@
       </p:sp>
       <p:cxnSp>
         <p:nvCxnSpPr>
-          <p:cNvPr id="89" name="직선 화살표 연결선 88">
-            <a:extLst>
-              <a:ext uri="{FF2B5EF4-FFF2-40B4-BE49-F238E27FC236}">
-                <a16:creationId xmlns:a16="http://schemas.microsoft.com/office/drawing/2014/main" id="{58DB6110-4E14-4422-AC74-558F80A2C0D8}"/>
+          <p:cNvPr id="129" name="직선 화살표 연결선 128">
+            <a:extLst>
+              <a:ext uri="{FF2B5EF4-FFF2-40B4-BE49-F238E27FC236}">
+                <a16:creationId xmlns:a16="http://schemas.microsoft.com/office/drawing/2014/main" id="{763EDC8C-0262-480E-91CE-D9CDB3847A0A}"/>
               </a:ext>
             </a:extLst>
           </p:cNvPr>
           <p:cNvCxnSpPr>
             <a:cxnSpLocks/>
-            <a:stCxn id="99" idx="2"/>
-            <a:endCxn id="88" idx="0"/>
+            <a:stCxn id="128" idx="0"/>
+            <a:endCxn id="40" idx="2"/>
           </p:cNvCxnSpPr>
           <p:nvPr/>
         </p:nvCxnSpPr>
         <p:spPr>
-          <a:xfrm>
-            <a:off x="4603009" y="3619500"/>
-            <a:ext cx="0" cy="495873"/>
+          <a:xfrm flipV="1">
+            <a:off x="7101824" y="5125522"/>
+            <a:ext cx="1190585" cy="803564"/>
           </a:xfrm>
           <a:prstGeom prst="straightConnector1">
             <a:avLst/>
           </a:prstGeom>
-          <a:ln w="19050">
+          <a:ln w="28575">
             <a:tailEnd type="triangle"/>
           </a:ln>
         </p:spPr>
@@ -4463,10 +4568,45 @@
       </p:cxnSp>
       <p:sp>
         <p:nvSpPr>
-          <p:cNvPr id="92" name="직사각형 91">
-            <a:extLst>
-              <a:ext uri="{FF2B5EF4-FFF2-40B4-BE49-F238E27FC236}">
-                <a16:creationId xmlns:a16="http://schemas.microsoft.com/office/drawing/2014/main" id="{38B9985D-FC1F-4906-8C1A-CF74B11ABBC1}"/>
+          <p:cNvPr id="132" name="TextBox 131">
+            <a:extLst>
+              <a:ext uri="{FF2B5EF4-FFF2-40B4-BE49-F238E27FC236}">
+                <a16:creationId xmlns:a16="http://schemas.microsoft.com/office/drawing/2014/main" id="{1FE4545F-DB74-4ADB-BC20-C72D15C79BDB}"/>
+              </a:ext>
+            </a:extLst>
+          </p:cNvPr>
+          <p:cNvSpPr txBox="1"/>
+          <p:nvPr/>
+        </p:nvSpPr>
+        <p:spPr>
+          <a:xfrm>
+            <a:off x="6876228" y="5350411"/>
+            <a:ext cx="646331" cy="369332"/>
+          </a:xfrm>
+          <a:prstGeom prst="rect">
+            <a:avLst/>
+          </a:prstGeom>
+          <a:noFill/>
+        </p:spPr>
+        <p:txBody>
+          <a:bodyPr wrap="none" rtlCol="0">
+            <a:spAutoFit/>
+          </a:bodyPr>
+          <a:lstStyle/>
+          <a:p>
+            <a:r>
+              <a:rPr lang="ko-KR" altLang="en-US" dirty="0"/>
+              <a:t>상속</a:t>
+            </a:r>
+          </a:p>
+        </p:txBody>
+      </p:sp>
+      <p:sp>
+        <p:nvSpPr>
+          <p:cNvPr id="133" name="직사각형 132">
+            <a:extLst>
+              <a:ext uri="{FF2B5EF4-FFF2-40B4-BE49-F238E27FC236}">
+                <a16:creationId xmlns:a16="http://schemas.microsoft.com/office/drawing/2014/main" id="{D2E2B3DD-5F34-469E-838C-D6758AE43FF6}"/>
               </a:ext>
             </a:extLst>
           </p:cNvPr>
@@ -4475,8 +4615,8 @@
         </p:nvSpPr>
         <p:spPr>
           <a:xfrm>
-            <a:off x="8240571" y="495300"/>
-            <a:ext cx="1879600" cy="552450"/>
+            <a:off x="1797143" y="562943"/>
+            <a:ext cx="1295400" cy="546100"/>
           </a:xfrm>
           <a:prstGeom prst="rect">
             <a:avLst/>
@@ -4503,533 +4643,6 @@
             <a:pPr algn="ctr"/>
             <a:r>
               <a:rPr lang="en-US" altLang="ko-KR" dirty="0"/>
-              <a:t>&lt;&lt;Interface&gt;&gt;</a:t>
-            </a:r>
-          </a:p>
-          <a:p>
-            <a:pPr algn="ctr"/>
-            <a:r>
-              <a:rPr lang="en-US" altLang="ko-KR" dirty="0" err="1"/>
-              <a:t>MenuSelector</a:t>
-            </a:r>
-            <a:endParaRPr lang="ko-KR" altLang="en-US" dirty="0"/>
-          </a:p>
-        </p:txBody>
-      </p:sp>
-      <p:cxnSp>
-        <p:nvCxnSpPr>
-          <p:cNvPr id="93" name="직선 화살표 연결선 92">
-            <a:extLst>
-              <a:ext uri="{FF2B5EF4-FFF2-40B4-BE49-F238E27FC236}">
-                <a16:creationId xmlns:a16="http://schemas.microsoft.com/office/drawing/2014/main" id="{D2DCEC7A-D60F-4F37-803F-ABAC23FA6B97}"/>
-              </a:ext>
-            </a:extLst>
-          </p:cNvPr>
-          <p:cNvCxnSpPr>
-            <a:cxnSpLocks/>
-            <a:stCxn id="45" idx="3"/>
-            <a:endCxn id="92" idx="1"/>
-          </p:cNvCxnSpPr>
-          <p:nvPr/>
-        </p:nvCxnSpPr>
-        <p:spPr>
-          <a:xfrm>
-            <a:off x="7823533" y="765175"/>
-            <a:ext cx="417038" cy="6350"/>
-          </a:xfrm>
-          <a:prstGeom prst="straightConnector1">
-            <a:avLst/>
-          </a:prstGeom>
-          <a:ln w="19050">
-            <a:tailEnd type="triangle"/>
-          </a:ln>
-        </p:spPr>
-        <p:style>
-          <a:lnRef idx="1">
-            <a:schemeClr val="accent1"/>
-          </a:lnRef>
-          <a:fillRef idx="0">
-            <a:schemeClr val="accent1"/>
-          </a:fillRef>
-          <a:effectRef idx="0">
-            <a:schemeClr val="accent1"/>
-          </a:effectRef>
-          <a:fontRef idx="minor">
-            <a:schemeClr val="tx1"/>
-          </a:fontRef>
-        </p:style>
-      </p:cxnSp>
-      <p:sp>
-        <p:nvSpPr>
-          <p:cNvPr id="99" name="직사각형 98">
-            <a:extLst>
-              <a:ext uri="{FF2B5EF4-FFF2-40B4-BE49-F238E27FC236}">
-                <a16:creationId xmlns:a16="http://schemas.microsoft.com/office/drawing/2014/main" id="{E7FEC1D6-2913-4EA4-AB83-10A13A26EE9E}"/>
-              </a:ext>
-            </a:extLst>
-          </p:cNvPr>
-          <p:cNvSpPr/>
-          <p:nvPr/>
-        </p:nvSpPr>
-        <p:spPr>
-          <a:xfrm>
-            <a:off x="3663209" y="3067050"/>
-            <a:ext cx="1879600" cy="552450"/>
-          </a:xfrm>
-          <a:prstGeom prst="rect">
-            <a:avLst/>
-          </a:prstGeom>
-        </p:spPr>
-        <p:style>
-          <a:lnRef idx="2">
-            <a:schemeClr val="accent6"/>
-          </a:lnRef>
-          <a:fillRef idx="1">
-            <a:schemeClr val="lt1"/>
-          </a:fillRef>
-          <a:effectRef idx="0">
-            <a:schemeClr val="accent6"/>
-          </a:effectRef>
-          <a:fontRef idx="minor">
-            <a:schemeClr val="dk1"/>
-          </a:fontRef>
-        </p:style>
-        <p:txBody>
-          <a:bodyPr rtlCol="0" anchor="ctr"/>
-          <a:lstStyle/>
-          <a:p>
-            <a:pPr algn="ctr"/>
-            <a:r>
-              <a:rPr lang="en-US" altLang="ko-KR" dirty="0" err="1"/>
-              <a:t>AdminManager</a:t>
-            </a:r>
-            <a:endParaRPr lang="en-US" altLang="ko-KR" dirty="0"/>
-          </a:p>
-        </p:txBody>
-      </p:sp>
-      <p:cxnSp>
-        <p:nvCxnSpPr>
-          <p:cNvPr id="100" name="직선 화살표 연결선 99">
-            <a:extLst>
-              <a:ext uri="{FF2B5EF4-FFF2-40B4-BE49-F238E27FC236}">
-                <a16:creationId xmlns:a16="http://schemas.microsoft.com/office/drawing/2014/main" id="{6C75CDAA-7560-4D87-813A-159C7313DE4D}"/>
-              </a:ext>
-            </a:extLst>
-          </p:cNvPr>
-          <p:cNvCxnSpPr>
-            <a:cxnSpLocks/>
-            <a:stCxn id="99" idx="1"/>
-            <a:endCxn id="6" idx="3"/>
-          </p:cNvCxnSpPr>
-          <p:nvPr/>
-        </p:nvCxnSpPr>
-        <p:spPr>
-          <a:xfrm flipH="1">
-            <a:off x="3092543" y="3343275"/>
-            <a:ext cx="570666" cy="3175"/>
-          </a:xfrm>
-          <a:prstGeom prst="straightConnector1">
-            <a:avLst/>
-          </a:prstGeom>
-          <a:ln w="19050">
-            <a:tailEnd type="triangle"/>
-          </a:ln>
-        </p:spPr>
-        <p:style>
-          <a:lnRef idx="1">
-            <a:schemeClr val="accent1"/>
-          </a:lnRef>
-          <a:fillRef idx="0">
-            <a:schemeClr val="accent1"/>
-          </a:fillRef>
-          <a:effectRef idx="0">
-            <a:schemeClr val="accent1"/>
-          </a:effectRef>
-          <a:fontRef idx="minor">
-            <a:schemeClr val="tx1"/>
-          </a:fontRef>
-        </p:style>
-      </p:cxnSp>
-      <p:cxnSp>
-        <p:nvCxnSpPr>
-          <p:cNvPr id="106" name="직선 화살표 연결선 105">
-            <a:extLst>
-              <a:ext uri="{FF2B5EF4-FFF2-40B4-BE49-F238E27FC236}">
-                <a16:creationId xmlns:a16="http://schemas.microsoft.com/office/drawing/2014/main" id="{E5871BE4-DB20-473C-A9AC-5757131CD5F4}"/>
-              </a:ext>
-            </a:extLst>
-          </p:cNvPr>
-          <p:cNvCxnSpPr>
-            <a:cxnSpLocks/>
-            <a:stCxn id="99" idx="3"/>
-            <a:endCxn id="22" idx="1"/>
-          </p:cNvCxnSpPr>
-          <p:nvPr/>
-        </p:nvCxnSpPr>
-        <p:spPr>
-          <a:xfrm>
-            <a:off x="5542809" y="3343275"/>
-            <a:ext cx="401124" cy="868"/>
-          </a:xfrm>
-          <a:prstGeom prst="straightConnector1">
-            <a:avLst/>
-          </a:prstGeom>
-          <a:ln w="19050">
-            <a:tailEnd type="triangle"/>
-          </a:ln>
-        </p:spPr>
-        <p:style>
-          <a:lnRef idx="1">
-            <a:schemeClr val="accent1"/>
-          </a:lnRef>
-          <a:fillRef idx="0">
-            <a:schemeClr val="accent1"/>
-          </a:fillRef>
-          <a:effectRef idx="0">
-            <a:schemeClr val="accent1"/>
-          </a:effectRef>
-          <a:fontRef idx="minor">
-            <a:schemeClr val="tx1"/>
-          </a:fontRef>
-        </p:style>
-      </p:cxnSp>
-      <p:cxnSp>
-        <p:nvCxnSpPr>
-          <p:cNvPr id="110" name="직선 화살표 연결선 109">
-            <a:extLst>
-              <a:ext uri="{FF2B5EF4-FFF2-40B4-BE49-F238E27FC236}">
-                <a16:creationId xmlns:a16="http://schemas.microsoft.com/office/drawing/2014/main" id="{6ABE6C38-F118-40A2-BEB8-17C232BBC479}"/>
-              </a:ext>
-            </a:extLst>
-          </p:cNvPr>
-          <p:cNvCxnSpPr>
-            <a:cxnSpLocks/>
-            <a:stCxn id="16" idx="2"/>
-            <a:endCxn id="22" idx="0"/>
-          </p:cNvCxnSpPr>
-          <p:nvPr/>
-        </p:nvCxnSpPr>
-        <p:spPr>
-          <a:xfrm>
-            <a:off x="6883733" y="2279650"/>
-            <a:ext cx="0" cy="788268"/>
-          </a:xfrm>
-          <a:prstGeom prst="straightConnector1">
-            <a:avLst/>
-          </a:prstGeom>
-          <a:ln w="19050">
-            <a:tailEnd type="triangle"/>
-          </a:ln>
-        </p:spPr>
-        <p:style>
-          <a:lnRef idx="1">
-            <a:schemeClr val="accent1"/>
-          </a:lnRef>
-          <a:fillRef idx="0">
-            <a:schemeClr val="accent1"/>
-          </a:fillRef>
-          <a:effectRef idx="0">
-            <a:schemeClr val="accent1"/>
-          </a:effectRef>
-          <a:fontRef idx="minor">
-            <a:schemeClr val="tx1"/>
-          </a:fontRef>
-        </p:style>
-      </p:cxnSp>
-      <p:sp>
-        <p:nvSpPr>
-          <p:cNvPr id="118" name="직사각형 117">
-            <a:extLst>
-              <a:ext uri="{FF2B5EF4-FFF2-40B4-BE49-F238E27FC236}">
-                <a16:creationId xmlns:a16="http://schemas.microsoft.com/office/drawing/2014/main" id="{02255A0F-2C73-48A5-B2FE-107405E59D68}"/>
-              </a:ext>
-            </a:extLst>
-          </p:cNvPr>
-          <p:cNvSpPr/>
-          <p:nvPr/>
-        </p:nvSpPr>
-        <p:spPr>
-          <a:xfrm>
-            <a:off x="6285270" y="5944177"/>
-            <a:ext cx="1539701" cy="546100"/>
-          </a:xfrm>
-          <a:prstGeom prst="rect">
-            <a:avLst/>
-          </a:prstGeom>
-        </p:spPr>
-        <p:style>
-          <a:lnRef idx="2">
-            <a:schemeClr val="accent6"/>
-          </a:lnRef>
-          <a:fillRef idx="1">
-            <a:schemeClr val="lt1"/>
-          </a:fillRef>
-          <a:effectRef idx="0">
-            <a:schemeClr val="accent6"/>
-          </a:effectRef>
-          <a:fontRef idx="minor">
-            <a:schemeClr val="dk1"/>
-          </a:fontRef>
-        </p:style>
-        <p:txBody>
-          <a:bodyPr rtlCol="0" anchor="ctr"/>
-          <a:lstStyle/>
-          <a:p>
-            <a:pPr algn="ctr"/>
-            <a:r>
-              <a:rPr lang="en-US" altLang="ko-KR" dirty="0" err="1"/>
-              <a:t>RecommendList</a:t>
-            </a:r>
-            <a:endParaRPr lang="ko-KR" altLang="en-US" dirty="0"/>
-          </a:p>
-        </p:txBody>
-      </p:sp>
-      <p:cxnSp>
-        <p:nvCxnSpPr>
-          <p:cNvPr id="119" name="직선 화살표 연결선 118">
-            <a:extLst>
-              <a:ext uri="{FF2B5EF4-FFF2-40B4-BE49-F238E27FC236}">
-                <a16:creationId xmlns:a16="http://schemas.microsoft.com/office/drawing/2014/main" id="{0F3BB7E7-2A31-4958-8B25-24D1E7C4F0D9}"/>
-              </a:ext>
-            </a:extLst>
-          </p:cNvPr>
-          <p:cNvCxnSpPr>
-            <a:cxnSpLocks/>
-            <a:stCxn id="118" idx="0"/>
-            <a:endCxn id="40" idx="2"/>
-          </p:cNvCxnSpPr>
-          <p:nvPr/>
-        </p:nvCxnSpPr>
-        <p:spPr>
-          <a:xfrm flipH="1" flipV="1">
-            <a:off x="6623270" y="5140036"/>
-            <a:ext cx="431851" cy="804141"/>
-          </a:xfrm>
-          <a:prstGeom prst="straightConnector1">
-            <a:avLst/>
-          </a:prstGeom>
-          <a:ln w="19050">
-            <a:tailEnd type="triangle"/>
-          </a:ln>
-        </p:spPr>
-        <p:style>
-          <a:lnRef idx="1">
-            <a:schemeClr val="accent1"/>
-          </a:lnRef>
-          <a:fillRef idx="0">
-            <a:schemeClr val="accent1"/>
-          </a:fillRef>
-          <a:effectRef idx="0">
-            <a:schemeClr val="accent1"/>
-          </a:effectRef>
-          <a:fontRef idx="minor">
-            <a:schemeClr val="tx1"/>
-          </a:fontRef>
-        </p:style>
-      </p:cxnSp>
-      <p:sp>
-        <p:nvSpPr>
-          <p:cNvPr id="127" name="TextBox 126">
-            <a:extLst>
-              <a:ext uri="{FF2B5EF4-FFF2-40B4-BE49-F238E27FC236}">
-                <a16:creationId xmlns:a16="http://schemas.microsoft.com/office/drawing/2014/main" id="{41EC149D-E463-4C98-BEA8-C275C85778C2}"/>
-              </a:ext>
-            </a:extLst>
-          </p:cNvPr>
-          <p:cNvSpPr txBox="1"/>
-          <p:nvPr/>
-        </p:nvSpPr>
-        <p:spPr>
-          <a:xfrm>
-            <a:off x="6923846" y="5398077"/>
-            <a:ext cx="646331" cy="369332"/>
-          </a:xfrm>
-          <a:prstGeom prst="rect">
-            <a:avLst/>
-          </a:prstGeom>
-          <a:noFill/>
-        </p:spPr>
-        <p:txBody>
-          <a:bodyPr wrap="none" rtlCol="0">
-            <a:spAutoFit/>
-          </a:bodyPr>
-          <a:lstStyle/>
-          <a:p>
-            <a:r>
-              <a:rPr lang="ko-KR" altLang="en-US" dirty="0"/>
-              <a:t>상속</a:t>
-            </a:r>
-          </a:p>
-        </p:txBody>
-      </p:sp>
-      <p:sp>
-        <p:nvSpPr>
-          <p:cNvPr id="128" name="직사각형 127">
-            <a:extLst>
-              <a:ext uri="{FF2B5EF4-FFF2-40B4-BE49-F238E27FC236}">
-                <a16:creationId xmlns:a16="http://schemas.microsoft.com/office/drawing/2014/main" id="{12A0F47B-4187-49E6-B963-6792B3C6FE44}"/>
-              </a:ext>
-            </a:extLst>
-          </p:cNvPr>
-          <p:cNvSpPr/>
-          <p:nvPr/>
-        </p:nvSpPr>
-        <p:spPr>
-          <a:xfrm>
-            <a:off x="4833476" y="5943600"/>
-            <a:ext cx="1198417" cy="546100"/>
-          </a:xfrm>
-          <a:prstGeom prst="rect">
-            <a:avLst/>
-          </a:prstGeom>
-        </p:spPr>
-        <p:style>
-          <a:lnRef idx="2">
-            <a:schemeClr val="accent6"/>
-          </a:lnRef>
-          <a:fillRef idx="1">
-            <a:schemeClr val="lt1"/>
-          </a:fillRef>
-          <a:effectRef idx="0">
-            <a:schemeClr val="accent6"/>
-          </a:effectRef>
-          <a:fontRef idx="minor">
-            <a:schemeClr val="dk1"/>
-          </a:fontRef>
-        </p:style>
-        <p:txBody>
-          <a:bodyPr rtlCol="0" anchor="ctr"/>
-          <a:lstStyle/>
-          <a:p>
-            <a:pPr algn="ctr"/>
-            <a:r>
-              <a:rPr lang="en-US" altLang="ko-KR" dirty="0" err="1"/>
-              <a:t>MyList</a:t>
-            </a:r>
-            <a:endParaRPr lang="ko-KR" altLang="en-US" dirty="0"/>
-          </a:p>
-        </p:txBody>
-      </p:sp>
-      <p:cxnSp>
-        <p:nvCxnSpPr>
-          <p:cNvPr id="129" name="직선 화살표 연결선 128">
-            <a:extLst>
-              <a:ext uri="{FF2B5EF4-FFF2-40B4-BE49-F238E27FC236}">
-                <a16:creationId xmlns:a16="http://schemas.microsoft.com/office/drawing/2014/main" id="{763EDC8C-0262-480E-91CE-D9CDB3847A0A}"/>
-              </a:ext>
-            </a:extLst>
-          </p:cNvPr>
-          <p:cNvCxnSpPr>
-            <a:cxnSpLocks/>
-            <a:stCxn id="128" idx="0"/>
-            <a:endCxn id="40" idx="2"/>
-          </p:cNvCxnSpPr>
-          <p:nvPr/>
-        </p:nvCxnSpPr>
-        <p:spPr>
-          <a:xfrm flipV="1">
-            <a:off x="5432685" y="5140036"/>
-            <a:ext cx="1190585" cy="803564"/>
-          </a:xfrm>
-          <a:prstGeom prst="straightConnector1">
-            <a:avLst/>
-          </a:prstGeom>
-          <a:ln w="19050">
-            <a:tailEnd type="triangle"/>
-          </a:ln>
-        </p:spPr>
-        <p:style>
-          <a:lnRef idx="1">
-            <a:schemeClr val="accent1"/>
-          </a:lnRef>
-          <a:fillRef idx="0">
-            <a:schemeClr val="accent1"/>
-          </a:fillRef>
-          <a:effectRef idx="0">
-            <a:schemeClr val="accent1"/>
-          </a:effectRef>
-          <a:fontRef idx="minor">
-            <a:schemeClr val="tx1"/>
-          </a:fontRef>
-        </p:style>
-      </p:cxnSp>
-      <p:sp>
-        <p:nvSpPr>
-          <p:cNvPr id="132" name="TextBox 131">
-            <a:extLst>
-              <a:ext uri="{FF2B5EF4-FFF2-40B4-BE49-F238E27FC236}">
-                <a16:creationId xmlns:a16="http://schemas.microsoft.com/office/drawing/2014/main" id="{1FE4545F-DB74-4ADB-BC20-C72D15C79BDB}"/>
-              </a:ext>
-            </a:extLst>
-          </p:cNvPr>
-          <p:cNvSpPr txBox="1"/>
-          <p:nvPr/>
-        </p:nvSpPr>
-        <p:spPr>
-          <a:xfrm>
-            <a:off x="5207089" y="5364925"/>
-            <a:ext cx="646331" cy="369332"/>
-          </a:xfrm>
-          <a:prstGeom prst="rect">
-            <a:avLst/>
-          </a:prstGeom>
-          <a:noFill/>
-        </p:spPr>
-        <p:txBody>
-          <a:bodyPr wrap="none" rtlCol="0">
-            <a:spAutoFit/>
-          </a:bodyPr>
-          <a:lstStyle/>
-          <a:p>
-            <a:r>
-              <a:rPr lang="ko-KR" altLang="en-US" dirty="0"/>
-              <a:t>상속</a:t>
-            </a:r>
-          </a:p>
-        </p:txBody>
-      </p:sp>
-      <p:sp>
-        <p:nvSpPr>
-          <p:cNvPr id="133" name="직사각형 132">
-            <a:extLst>
-              <a:ext uri="{FF2B5EF4-FFF2-40B4-BE49-F238E27FC236}">
-                <a16:creationId xmlns:a16="http://schemas.microsoft.com/office/drawing/2014/main" id="{D2E2B3DD-5F34-469E-838C-D6758AE43FF6}"/>
-              </a:ext>
-            </a:extLst>
-          </p:cNvPr>
-          <p:cNvSpPr/>
-          <p:nvPr/>
-        </p:nvSpPr>
-        <p:spPr>
-          <a:xfrm>
-            <a:off x="1797143" y="562943"/>
-            <a:ext cx="1295400" cy="546100"/>
-          </a:xfrm>
-          <a:prstGeom prst="rect">
-            <a:avLst/>
-          </a:prstGeom>
-        </p:spPr>
-        <p:style>
-          <a:lnRef idx="2">
-            <a:schemeClr val="accent6"/>
-          </a:lnRef>
-          <a:fillRef idx="1">
-            <a:schemeClr val="lt1"/>
-          </a:fillRef>
-          <a:effectRef idx="0">
-            <a:schemeClr val="accent6"/>
-          </a:effectRef>
-          <a:fontRef idx="minor">
-            <a:schemeClr val="dk1"/>
-          </a:fontRef>
-        </p:style>
-        <p:txBody>
-          <a:bodyPr rtlCol="0" anchor="ctr"/>
-          <a:lstStyle/>
-          <a:p>
-            <a:pPr algn="ctr"/>
-            <a:r>
-              <a:rPr lang="en-US" altLang="ko-KR" dirty="0"/>
               <a:t>Profile</a:t>
             </a:r>
             <a:endParaRPr lang="ko-KR" altLang="en-US" dirty="0"/>
@@ -5060,7 +4673,7 @@
           <a:prstGeom prst="straightConnector1">
             <a:avLst/>
           </a:prstGeom>
-          <a:ln w="19050">
+          <a:ln w="28575">
             <a:tailEnd type="triangle"/>
           </a:ln>
         </p:spPr>
@@ -5097,13 +4710,13 @@
         </p:nvCxnSpPr>
         <p:spPr>
           <a:xfrm flipV="1">
-            <a:off x="6623270" y="3620368"/>
-            <a:ext cx="2482055" cy="973568"/>
+            <a:off x="8292409" y="3620368"/>
+            <a:ext cx="812916" cy="959054"/>
           </a:xfrm>
           <a:prstGeom prst="straightConnector1">
             <a:avLst/>
           </a:prstGeom>
-          <a:ln w="19050">
+          <a:ln w="28575">
             <a:tailEnd type="triangle"/>
           </a:ln>
         </p:spPr>
@@ -5136,7 +4749,7 @@
         </p:nvSpPr>
         <p:spPr>
           <a:xfrm>
-            <a:off x="6677213" y="3989245"/>
+            <a:off x="7880899" y="3930707"/>
             <a:ext cx="646331" cy="369332"/>
           </a:xfrm>
           <a:prstGeom prst="rect">
@@ -5168,22 +4781,22 @@
           </p:cNvPr>
           <p:cNvCxnSpPr>
             <a:cxnSpLocks/>
-            <a:stCxn id="4" idx="1"/>
+            <a:stCxn id="133" idx="1"/>
             <a:endCxn id="40" idx="1"/>
           </p:cNvCxnSpPr>
           <p:nvPr/>
         </p:nvCxnSpPr>
         <p:spPr>
           <a:xfrm rot="10800000" flipH="1" flipV="1">
-            <a:off x="1797142" y="2000250"/>
-            <a:ext cx="4178427" cy="2866736"/>
+            <a:off x="1797143" y="835992"/>
+            <a:ext cx="5847566" cy="4016479"/>
           </a:xfrm>
           <a:prstGeom prst="bentConnector3">
             <a:avLst>
-              <a:gd name="adj1" fmla="val -5471"/>
+              <a:gd name="adj1" fmla="val -3909"/>
             </a:avLst>
           </a:prstGeom>
-          <a:ln w="19050">
+          <a:ln w="28575">
             <a:tailEnd type="triangle"/>
           </a:ln>
         </p:spPr>
@@ -5406,7 +5019,7 @@
             <a:prstGeom prst="straightConnector1">
               <a:avLst/>
             </a:prstGeom>
-            <a:ln w="19050">
+            <a:ln w="28575">
               <a:tailEnd type="triangle"/>
             </a:ln>
           </p:spPr>
@@ -5475,8 +5088,8 @@
         </p:nvSpPr>
         <p:spPr>
           <a:xfrm>
-            <a:off x="8674944" y="1686942"/>
-            <a:ext cx="1284326" cy="1200329"/>
+            <a:off x="8674944" y="1968609"/>
+            <a:ext cx="716799" cy="646331"/>
           </a:xfrm>
           <a:prstGeom prst="rect">
             <a:avLst/>
@@ -5498,27 +5111,6 @@
             <a:r>
               <a:rPr lang="en-US" altLang="ko-KR" dirty="0"/>
               <a:t>- PW</a:t>
-            </a:r>
-          </a:p>
-          <a:p>
-            <a:r>
-              <a:rPr lang="en-US" altLang="ko-KR" dirty="0"/>
-              <a:t>- </a:t>
-            </a:r>
-            <a:r>
-              <a:rPr lang="ko-KR" altLang="en-US" dirty="0" err="1"/>
-              <a:t>찜목록</a:t>
-            </a:r>
-            <a:endParaRPr lang="en-US" altLang="ko-KR" dirty="0"/>
-          </a:p>
-          <a:p>
-            <a:r>
-              <a:rPr lang="en-US" altLang="ko-KR" dirty="0"/>
-              <a:t>- </a:t>
-            </a:r>
-            <a:r>
-              <a:rPr lang="ko-KR" altLang="en-US" dirty="0"/>
-              <a:t>선호장르</a:t>
             </a:r>
           </a:p>
         </p:txBody>
@@ -5540,9 +5132,9 @@
           <p:nvPr/>
         </p:nvCxnSpPr>
         <p:spPr>
-          <a:xfrm flipV="1">
-            <a:off x="8140125" y="2287107"/>
-            <a:ext cx="534819" cy="1200"/>
+          <a:xfrm>
+            <a:off x="8140125" y="2288307"/>
+            <a:ext cx="534819" cy="3468"/>
           </a:xfrm>
           <a:prstGeom prst="line">
             <a:avLst/>
@@ -5674,7 +5266,7 @@
           <a:prstGeom prst="straightConnector1">
             <a:avLst/>
           </a:prstGeom>
-          <a:ln w="19050">
+          <a:ln w="28575">
             <a:tailEnd type="triangle"/>
           </a:ln>
         </p:spPr>
@@ -5748,8 +5340,8 @@
         </p:nvSpPr>
         <p:spPr>
           <a:xfrm>
-            <a:off x="8789244" y="1029291"/>
-            <a:ext cx="1165704" cy="369332"/>
+            <a:off x="8789244" y="757150"/>
+            <a:ext cx="1396536" cy="923330"/>
           </a:xfrm>
           <a:prstGeom prst="rect">
             <a:avLst/>
@@ -5769,6 +5361,28 @@
             <a:r>
               <a:rPr lang="ko-KR" altLang="en-US" dirty="0"/>
               <a:t>닉네임</a:t>
+            </a:r>
+            <a:endParaRPr lang="en-US" altLang="ko-KR" dirty="0"/>
+          </a:p>
+          <a:p>
+            <a:pPr marL="285750" indent="-285750">
+              <a:buFontTx/>
+              <a:buChar char="-"/>
+            </a:pPr>
+            <a:r>
+              <a:rPr lang="ko-KR" altLang="en-US" dirty="0"/>
+              <a:t>선호장르</a:t>
+            </a:r>
+            <a:endParaRPr lang="en-US" altLang="ko-KR" dirty="0"/>
+          </a:p>
+          <a:p>
+            <a:pPr marL="285750" indent="-285750">
+              <a:buFontTx/>
+              <a:buChar char="-"/>
+            </a:pPr>
+            <a:r>
+              <a:rPr lang="ko-KR" altLang="en-US" dirty="0" err="1"/>
+              <a:t>찜목록</a:t>
             </a:r>
             <a:endParaRPr lang="en-US" altLang="ko-KR" dirty="0"/>
           </a:p>
@@ -5792,8 +5406,8 @@
         </p:nvCxnSpPr>
         <p:spPr>
           <a:xfrm flipV="1">
-            <a:off x="8140125" y="1213957"/>
-            <a:ext cx="649119" cy="4891"/>
+            <a:off x="8140125" y="1218815"/>
+            <a:ext cx="649119" cy="33"/>
           </a:xfrm>
           <a:prstGeom prst="line">
             <a:avLst/>
@@ -5922,7 +5536,7 @@
           <a:prstGeom prst="straightConnector1">
             <a:avLst/>
           </a:prstGeom>
-          <a:ln w="19050">
+          <a:ln w="28575">
             <a:tailEnd type="triangle"/>
           </a:ln>
         </p:spPr>
@@ -6372,7 +5986,7 @@
           <a:prstGeom prst="straightConnector1">
             <a:avLst/>
           </a:prstGeom>
-          <a:ln w="19050">
+          <a:ln w="28575">
             <a:tailEnd type="triangle"/>
           </a:ln>
         </p:spPr>
@@ -6493,7 +6107,7 @@
           <a:prstGeom prst="straightConnector1">
             <a:avLst/>
           </a:prstGeom>
-          <a:ln w="19050">
+          <a:ln w="28575">
             <a:tailEnd type="triangle"/>
           </a:ln>
         </p:spPr>
@@ -6562,10 +6176,227 @@
       </p:sp>
       <p:sp>
         <p:nvSpPr>
-          <p:cNvPr id="7" name="직사각형 6">
-            <a:extLst>
-              <a:ext uri="{FF2B5EF4-FFF2-40B4-BE49-F238E27FC236}">
-                <a16:creationId xmlns:a16="http://schemas.microsoft.com/office/drawing/2014/main" id="{ACB7906D-8FF4-4D9C-A7C0-D78662E2AFD7}"/>
+          <p:cNvPr id="11" name="TextBox 10">
+            <a:extLst>
+              <a:ext uri="{FF2B5EF4-FFF2-40B4-BE49-F238E27FC236}">
+                <a16:creationId xmlns:a16="http://schemas.microsoft.com/office/drawing/2014/main" id="{9778374A-0A3C-455B-8E8A-689BBAD6E5D9}"/>
+              </a:ext>
+            </a:extLst>
+          </p:cNvPr>
+          <p:cNvSpPr txBox="1"/>
+          <p:nvPr/>
+        </p:nvSpPr>
+        <p:spPr>
+          <a:xfrm>
+            <a:off x="8757780" y="1926350"/>
+            <a:ext cx="1634448" cy="1477328"/>
+          </a:xfrm>
+          <a:prstGeom prst="rect">
+            <a:avLst/>
+          </a:prstGeom>
+          <a:noFill/>
+        </p:spPr>
+        <p:txBody>
+          <a:bodyPr wrap="square" rtlCol="0">
+            <a:spAutoFit/>
+          </a:bodyPr>
+          <a:lstStyle/>
+          <a:p>
+            <a:pPr marL="285750" indent="-285750">
+              <a:buFontTx/>
+              <a:buChar char="-"/>
+            </a:pPr>
+            <a:r>
+              <a:rPr lang="ko-KR" altLang="en-US" dirty="0"/>
+              <a:t>제목</a:t>
+            </a:r>
+            <a:endParaRPr lang="en-US" altLang="ko-KR" dirty="0"/>
+          </a:p>
+          <a:p>
+            <a:pPr marL="285750" indent="-285750">
+              <a:buFontTx/>
+              <a:buChar char="-"/>
+            </a:pPr>
+            <a:r>
+              <a:rPr lang="ko-KR" altLang="en-US" dirty="0"/>
+              <a:t>장르</a:t>
+            </a:r>
+            <a:endParaRPr lang="en-US" altLang="ko-KR" dirty="0"/>
+          </a:p>
+          <a:p>
+            <a:pPr marL="285750" indent="-285750">
+              <a:buFontTx/>
+              <a:buChar char="-"/>
+            </a:pPr>
+            <a:r>
+              <a:rPr lang="ko-KR" altLang="en-US" dirty="0" err="1"/>
+              <a:t>별점</a:t>
+            </a:r>
+            <a:endParaRPr lang="en-US" altLang="ko-KR" dirty="0"/>
+          </a:p>
+          <a:p>
+            <a:pPr marL="285750" indent="-285750">
+              <a:buFontTx/>
+              <a:buChar char="-"/>
+            </a:pPr>
+            <a:r>
+              <a:rPr lang="ko-KR" altLang="en-US" dirty="0"/>
+              <a:t>줄거리</a:t>
+            </a:r>
+            <a:endParaRPr lang="en-US" altLang="ko-KR" dirty="0"/>
+          </a:p>
+          <a:p>
+            <a:pPr marL="285750" indent="-285750">
+              <a:buFontTx/>
+              <a:buChar char="-"/>
+            </a:pPr>
+            <a:r>
+              <a:rPr lang="ko-KR" altLang="en-US" dirty="0">
+                <a:solidFill>
+                  <a:srgbClr val="FF0000"/>
+                </a:solidFill>
+              </a:rPr>
+              <a:t>관람등급</a:t>
+            </a:r>
+            <a:endParaRPr lang="en-US" altLang="ko-KR" dirty="0">
+              <a:solidFill>
+                <a:srgbClr val="FF0000"/>
+              </a:solidFill>
+            </a:endParaRPr>
+          </a:p>
+        </p:txBody>
+      </p:sp>
+      <p:cxnSp>
+        <p:nvCxnSpPr>
+          <p:cNvPr id="12" name="직선 연결선 11">
+            <a:extLst>
+              <a:ext uri="{FF2B5EF4-FFF2-40B4-BE49-F238E27FC236}">
+                <a16:creationId xmlns:a16="http://schemas.microsoft.com/office/drawing/2014/main" id="{0E6850AA-2FFD-43C6-9986-7556D68D8D45}"/>
+              </a:ext>
+            </a:extLst>
+          </p:cNvPr>
+          <p:cNvCxnSpPr>
+            <a:cxnSpLocks/>
+            <a:stCxn id="6" idx="3"/>
+            <a:endCxn id="11" idx="1"/>
+          </p:cNvCxnSpPr>
+          <p:nvPr/>
+        </p:nvCxnSpPr>
+        <p:spPr>
+          <a:xfrm>
+            <a:off x="8076625" y="2658343"/>
+            <a:ext cx="681155" cy="6671"/>
+          </a:xfrm>
+          <a:prstGeom prst="line">
+            <a:avLst/>
+          </a:prstGeom>
+          <a:ln w="28575"/>
+        </p:spPr>
+        <p:style>
+          <a:lnRef idx="1">
+            <a:schemeClr val="accent1"/>
+          </a:lnRef>
+          <a:fillRef idx="0">
+            <a:schemeClr val="accent1"/>
+          </a:fillRef>
+          <a:effectRef idx="0">
+            <a:schemeClr val="accent1"/>
+          </a:effectRef>
+          <a:fontRef idx="minor">
+            <a:schemeClr val="tx1"/>
+          </a:fontRef>
+        </p:style>
+      </p:cxnSp>
+      <p:sp>
+        <p:nvSpPr>
+          <p:cNvPr id="15" name="TextBox 14">
+            <a:extLst>
+              <a:ext uri="{FF2B5EF4-FFF2-40B4-BE49-F238E27FC236}">
+                <a16:creationId xmlns:a16="http://schemas.microsoft.com/office/drawing/2014/main" id="{65E85499-7870-4BDA-BE35-0DD3C3C5F61A}"/>
+              </a:ext>
+            </a:extLst>
+          </p:cNvPr>
+          <p:cNvSpPr txBox="1"/>
+          <p:nvPr/>
+        </p:nvSpPr>
+        <p:spPr>
+          <a:xfrm>
+            <a:off x="1275358" y="2473677"/>
+            <a:ext cx="2039341" cy="369332"/>
+          </a:xfrm>
+          <a:prstGeom prst="rect">
+            <a:avLst/>
+          </a:prstGeom>
+          <a:noFill/>
+        </p:spPr>
+        <p:txBody>
+          <a:bodyPr wrap="none" rtlCol="0">
+            <a:spAutoFit/>
+          </a:bodyPr>
+          <a:lstStyle/>
+          <a:p>
+            <a:r>
+              <a:rPr lang="en-US" altLang="ko-KR" dirty="0"/>
+              <a:t>- </a:t>
+            </a:r>
+            <a:r>
+              <a:rPr lang="ko-KR" altLang="en-US" dirty="0"/>
+              <a:t>영상관리</a:t>
+            </a:r>
+            <a:r>
+              <a:rPr lang="en-US" altLang="ko-KR" dirty="0"/>
+              <a:t>(CRUD)</a:t>
+            </a:r>
+          </a:p>
+        </p:txBody>
+      </p:sp>
+      <p:cxnSp>
+        <p:nvCxnSpPr>
+          <p:cNvPr id="16" name="직선 연결선 15">
+            <a:extLst>
+              <a:ext uri="{FF2B5EF4-FFF2-40B4-BE49-F238E27FC236}">
+                <a16:creationId xmlns:a16="http://schemas.microsoft.com/office/drawing/2014/main" id="{EB663284-B627-4D00-A30A-C9EDE2A1E1F5}"/>
+              </a:ext>
+            </a:extLst>
+          </p:cNvPr>
+          <p:cNvCxnSpPr>
+            <a:cxnSpLocks/>
+            <a:stCxn id="4" idx="1"/>
+            <a:endCxn id="15" idx="3"/>
+          </p:cNvCxnSpPr>
+          <p:nvPr/>
+        </p:nvCxnSpPr>
+        <p:spPr>
+          <a:xfrm flipH="1">
+            <a:off x="3314699" y="2658343"/>
+            <a:ext cx="508334" cy="0"/>
+          </a:xfrm>
+          <a:prstGeom prst="line">
+            <a:avLst/>
+          </a:prstGeom>
+          <a:ln w="28575"/>
+        </p:spPr>
+        <p:style>
+          <a:lnRef idx="1">
+            <a:schemeClr val="accent1"/>
+          </a:lnRef>
+          <a:fillRef idx="0">
+            <a:schemeClr val="accent1"/>
+          </a:fillRef>
+          <a:effectRef idx="0">
+            <a:schemeClr val="accent1"/>
+          </a:effectRef>
+          <a:fontRef idx="minor">
+            <a:schemeClr val="tx1"/>
+          </a:fontRef>
+        </p:style>
+      </p:cxnSp>
+      <p:sp>
+        <p:nvSpPr>
+          <p:cNvPr id="19" name="직사각형 18">
+            <a:extLst>
+              <a:ext uri="{FF2B5EF4-FFF2-40B4-BE49-F238E27FC236}">
+                <a16:creationId xmlns:a16="http://schemas.microsoft.com/office/drawing/2014/main" id="{AA2BCBAB-0D11-4BE1-B9E9-4600796199BB}"/>
               </a:ext>
             </a:extLst>
           </p:cNvPr>
@@ -6574,8 +6405,8 @@
         </p:nvSpPr>
         <p:spPr>
           <a:xfrm>
-            <a:off x="5257225" y="1046311"/>
-            <a:ext cx="1879600" cy="552450"/>
+            <a:off x="6489125" y="3852758"/>
+            <a:ext cx="1295400" cy="546100"/>
           </a:xfrm>
           <a:prstGeom prst="rect">
             <a:avLst/>
@@ -6601,15 +6432,8 @@
           <a:p>
             <a:pPr algn="ctr"/>
             <a:r>
-              <a:rPr lang="en-US" altLang="ko-KR" dirty="0"/>
-              <a:t>&lt;&lt;Interface&gt;&gt;</a:t>
-            </a:r>
-          </a:p>
-          <a:p>
-            <a:pPr algn="ctr"/>
-            <a:r>
               <a:rPr lang="en-US" altLang="ko-KR" dirty="0" err="1"/>
-              <a:t>KidsMovies</a:t>
+              <a:t>PlayList</a:t>
             </a:r>
             <a:endParaRPr lang="ko-KR" altLang="en-US" dirty="0"/>
           </a:p>
@@ -6617,10 +6441,10 @@
       </p:sp>
       <p:sp>
         <p:nvSpPr>
-          <p:cNvPr id="8" name="직사각형 7">
-            <a:extLst>
-              <a:ext uri="{FF2B5EF4-FFF2-40B4-BE49-F238E27FC236}">
-                <a16:creationId xmlns:a16="http://schemas.microsoft.com/office/drawing/2014/main" id="{80404A41-E8C6-4AF7-BE9C-D78A9426F667}"/>
+          <p:cNvPr id="21" name="직사각형 20">
+            <a:extLst>
+              <a:ext uri="{FF2B5EF4-FFF2-40B4-BE49-F238E27FC236}">
+                <a16:creationId xmlns:a16="http://schemas.microsoft.com/office/drawing/2014/main" id="{E678BA37-1ED1-4EC7-883C-EE0EC0FE6A5E}"/>
               </a:ext>
             </a:extLst>
           </p:cNvPr>
@@ -6629,8 +6453,8 @@
         </p:nvSpPr>
         <p:spPr>
           <a:xfrm>
-            <a:off x="7280841" y="1043686"/>
-            <a:ext cx="1879600" cy="552450"/>
+            <a:off x="7141725" y="5202999"/>
+            <a:ext cx="1539701" cy="546100"/>
           </a:xfrm>
           <a:prstGeom prst="rect">
             <a:avLst/>
@@ -6656,118 +6480,40 @@
           <a:p>
             <a:pPr algn="ctr"/>
             <a:r>
-              <a:rPr lang="en-US" altLang="ko-KR" dirty="0"/>
-              <a:t>&lt;&lt;Interface&gt;&gt;</a:t>
-            </a:r>
-          </a:p>
-          <a:p>
-            <a:pPr algn="ctr"/>
-            <a:r>
               <a:rPr lang="en-US" altLang="ko-KR" dirty="0" err="1"/>
-              <a:t>AdultMovies</a:t>
+              <a:t>RecommendList</a:t>
             </a:r>
             <a:endParaRPr lang="ko-KR" altLang="en-US" dirty="0"/>
-          </a:p>
-        </p:txBody>
-      </p:sp>
-      <p:sp>
-        <p:nvSpPr>
-          <p:cNvPr id="11" name="TextBox 10">
-            <a:extLst>
-              <a:ext uri="{FF2B5EF4-FFF2-40B4-BE49-F238E27FC236}">
-                <a16:creationId xmlns:a16="http://schemas.microsoft.com/office/drawing/2014/main" id="{9778374A-0A3C-455B-8E8A-689BBAD6E5D9}"/>
-              </a:ext>
-            </a:extLst>
-          </p:cNvPr>
-          <p:cNvSpPr txBox="1"/>
-          <p:nvPr/>
-        </p:nvSpPr>
-        <p:spPr>
-          <a:xfrm>
-            <a:off x="8757780" y="2056978"/>
-            <a:ext cx="1342441" cy="1200329"/>
-          </a:xfrm>
-          <a:prstGeom prst="rect">
-            <a:avLst/>
-          </a:prstGeom>
-          <a:noFill/>
-        </p:spPr>
-        <p:txBody>
-          <a:bodyPr wrap="square" rtlCol="0">
-            <a:spAutoFit/>
-          </a:bodyPr>
-          <a:lstStyle/>
-          <a:p>
-            <a:pPr marL="285750" indent="-285750">
-              <a:buFontTx/>
-              <a:buChar char="-"/>
-            </a:pPr>
-            <a:r>
-              <a:rPr lang="ko-KR" altLang="en-US" dirty="0"/>
-              <a:t>제목</a:t>
-            </a:r>
-            <a:endParaRPr lang="en-US" altLang="ko-KR" dirty="0"/>
-          </a:p>
-          <a:p>
-            <a:pPr marL="285750" indent="-285750">
-              <a:buFontTx/>
-              <a:buChar char="-"/>
-            </a:pPr>
-            <a:r>
-              <a:rPr lang="ko-KR" altLang="en-US" dirty="0"/>
-              <a:t>장르</a:t>
-            </a:r>
-            <a:endParaRPr lang="en-US" altLang="ko-KR" dirty="0"/>
-          </a:p>
-          <a:p>
-            <a:pPr marL="285750" indent="-285750">
-              <a:buFontTx/>
-              <a:buChar char="-"/>
-            </a:pPr>
-            <a:r>
-              <a:rPr lang="ko-KR" altLang="en-US" dirty="0" err="1"/>
-              <a:t>별점</a:t>
-            </a:r>
-            <a:endParaRPr lang="en-US" altLang="ko-KR" dirty="0"/>
-          </a:p>
-          <a:p>
-            <a:pPr marL="285750" indent="-285750">
-              <a:buFontTx/>
-              <a:buChar char="-"/>
-            </a:pPr>
-            <a:r>
-              <a:rPr lang="ko-KR" altLang="en-US" dirty="0"/>
-              <a:t>줄거리</a:t>
-            </a:r>
-            <a:endParaRPr lang="en-US" altLang="ko-KR" dirty="0"/>
           </a:p>
         </p:txBody>
       </p:sp>
       <p:cxnSp>
         <p:nvCxnSpPr>
-          <p:cNvPr id="12" name="직선 연결선 11">
-            <a:extLst>
-              <a:ext uri="{FF2B5EF4-FFF2-40B4-BE49-F238E27FC236}">
-                <a16:creationId xmlns:a16="http://schemas.microsoft.com/office/drawing/2014/main" id="{0E6850AA-2FFD-43C6-9986-7556D68D8D45}"/>
+          <p:cNvPr id="22" name="직선 화살표 연결선 21">
+            <a:extLst>
+              <a:ext uri="{FF2B5EF4-FFF2-40B4-BE49-F238E27FC236}">
+                <a16:creationId xmlns:a16="http://schemas.microsoft.com/office/drawing/2014/main" id="{4ED7B244-A07D-4C7E-BE09-28CCBCEF21B7}"/>
               </a:ext>
             </a:extLst>
           </p:cNvPr>
           <p:cNvCxnSpPr>
             <a:cxnSpLocks/>
-            <a:stCxn id="6" idx="3"/>
-            <a:endCxn id="11" idx="1"/>
+            <a:stCxn id="21" idx="0"/>
+            <a:endCxn id="19" idx="2"/>
           </p:cNvCxnSpPr>
           <p:nvPr/>
         </p:nvCxnSpPr>
         <p:spPr>
-          <a:xfrm flipV="1">
-            <a:off x="8076625" y="2657143"/>
-            <a:ext cx="681155" cy="1200"/>
-          </a:xfrm>
-          <a:prstGeom prst="line">
-            <a:avLst/>
-          </a:prstGeom>
-          <a:ln w="28575"/>
+          <a:xfrm flipH="1" flipV="1">
+            <a:off x="7136825" y="4398858"/>
+            <a:ext cx="774751" cy="804141"/>
+          </a:xfrm>
+          <a:prstGeom prst="straightConnector1">
+            <a:avLst/>
+          </a:prstGeom>
+          <a:ln w="28575">
+            <a:tailEnd type="triangle"/>
+          </a:ln>
         </p:spPr>
         <p:style>
           <a:lnRef idx="1">
@@ -6786,10 +6532,10 @@
       </p:cxnSp>
       <p:sp>
         <p:nvSpPr>
-          <p:cNvPr id="15" name="TextBox 14">
-            <a:extLst>
-              <a:ext uri="{FF2B5EF4-FFF2-40B4-BE49-F238E27FC236}">
-                <a16:creationId xmlns:a16="http://schemas.microsoft.com/office/drawing/2014/main" id="{65E85499-7870-4BDA-BE35-0DD3C3C5F61A}"/>
+          <p:cNvPr id="23" name="TextBox 22">
+            <a:extLst>
+              <a:ext uri="{FF2B5EF4-FFF2-40B4-BE49-F238E27FC236}">
+                <a16:creationId xmlns:a16="http://schemas.microsoft.com/office/drawing/2014/main" id="{8C16362F-E032-4316-B05D-24453C3C1A72}"/>
               </a:ext>
             </a:extLst>
           </p:cNvPr>
@@ -6798,8 +6544,8 @@
         </p:nvSpPr>
         <p:spPr>
           <a:xfrm>
-            <a:off x="1275358" y="2473677"/>
-            <a:ext cx="2039341" cy="369332"/>
+            <a:off x="7780301" y="4656899"/>
+            <a:ext cx="646331" cy="369332"/>
           </a:xfrm>
           <a:prstGeom prst="rect">
             <a:avLst/>
@@ -6813,67 +6559,18 @@
           <a:lstStyle/>
           <a:p>
             <a:r>
-              <a:rPr lang="en-US" altLang="ko-KR" dirty="0"/>
-              <a:t>- </a:t>
-            </a:r>
-            <a:r>
               <a:rPr lang="ko-KR" altLang="en-US" dirty="0"/>
-              <a:t>영상관리</a:t>
-            </a:r>
-            <a:r>
-              <a:rPr lang="en-US" altLang="ko-KR" dirty="0"/>
-              <a:t>(CRUD)</a:t>
-            </a:r>
-          </a:p>
-        </p:txBody>
-      </p:sp>
-      <p:cxnSp>
-        <p:nvCxnSpPr>
-          <p:cNvPr id="16" name="직선 연결선 15">
-            <a:extLst>
-              <a:ext uri="{FF2B5EF4-FFF2-40B4-BE49-F238E27FC236}">
-                <a16:creationId xmlns:a16="http://schemas.microsoft.com/office/drawing/2014/main" id="{EB663284-B627-4D00-A30A-C9EDE2A1E1F5}"/>
-              </a:ext>
-            </a:extLst>
-          </p:cNvPr>
-          <p:cNvCxnSpPr>
-            <a:cxnSpLocks/>
-            <a:stCxn id="4" idx="1"/>
-            <a:endCxn id="15" idx="3"/>
-          </p:cNvCxnSpPr>
-          <p:nvPr/>
-        </p:nvCxnSpPr>
-        <p:spPr>
-          <a:xfrm flipH="1">
-            <a:off x="3314699" y="2658343"/>
-            <a:ext cx="508334" cy="0"/>
-          </a:xfrm>
-          <a:prstGeom prst="line">
-            <a:avLst/>
-          </a:prstGeom>
-          <a:ln w="28575"/>
-        </p:spPr>
-        <p:style>
-          <a:lnRef idx="1">
-            <a:schemeClr val="accent1"/>
-          </a:lnRef>
-          <a:fillRef idx="0">
-            <a:schemeClr val="accent1"/>
-          </a:fillRef>
-          <a:effectRef idx="0">
-            <a:schemeClr val="accent1"/>
-          </a:effectRef>
-          <a:fontRef idx="minor">
-            <a:schemeClr val="tx1"/>
-          </a:fontRef>
-        </p:style>
-      </p:cxnSp>
-      <p:sp>
-        <p:nvSpPr>
-          <p:cNvPr id="19" name="직사각형 18">
-            <a:extLst>
-              <a:ext uri="{FF2B5EF4-FFF2-40B4-BE49-F238E27FC236}">
-                <a16:creationId xmlns:a16="http://schemas.microsoft.com/office/drawing/2014/main" id="{AA2BCBAB-0D11-4BE1-B9E9-4600796199BB}"/>
+              <a:t>상속</a:t>
+            </a:r>
+          </a:p>
+        </p:txBody>
+      </p:sp>
+      <p:sp>
+        <p:nvSpPr>
+          <p:cNvPr id="24" name="직사각형 23">
+            <a:extLst>
+              <a:ext uri="{FF2B5EF4-FFF2-40B4-BE49-F238E27FC236}">
+                <a16:creationId xmlns:a16="http://schemas.microsoft.com/office/drawing/2014/main" id="{4C8EA998-94D7-4FEB-A498-73642C5BE5A6}"/>
               </a:ext>
             </a:extLst>
           </p:cNvPr>
@@ -6882,8 +6579,8 @@
         </p:nvSpPr>
         <p:spPr>
           <a:xfrm>
-            <a:off x="6489125" y="3852758"/>
-            <a:ext cx="1295400" cy="546100"/>
+            <a:off x="5753431" y="5202422"/>
+            <a:ext cx="1198417" cy="546100"/>
           </a:xfrm>
           <a:prstGeom prst="rect">
             <a:avLst/>
@@ -6910,55 +6607,7 @@
             <a:pPr algn="ctr"/>
             <a:r>
               <a:rPr lang="en-US" altLang="ko-KR" dirty="0" err="1"/>
-              <a:t>PlayList</a:t>
-            </a:r>
-            <a:endParaRPr lang="ko-KR" altLang="en-US" dirty="0"/>
-          </a:p>
-        </p:txBody>
-      </p:sp>
-      <p:sp>
-        <p:nvSpPr>
-          <p:cNvPr id="21" name="직사각형 20">
-            <a:extLst>
-              <a:ext uri="{FF2B5EF4-FFF2-40B4-BE49-F238E27FC236}">
-                <a16:creationId xmlns:a16="http://schemas.microsoft.com/office/drawing/2014/main" id="{E678BA37-1ED1-4EC7-883C-EE0EC0FE6A5E}"/>
-              </a:ext>
-            </a:extLst>
-          </p:cNvPr>
-          <p:cNvSpPr/>
-          <p:nvPr/>
-        </p:nvSpPr>
-        <p:spPr>
-          <a:xfrm>
-            <a:off x="7141725" y="5202999"/>
-            <a:ext cx="1539701" cy="546100"/>
-          </a:xfrm>
-          <a:prstGeom prst="rect">
-            <a:avLst/>
-          </a:prstGeom>
-        </p:spPr>
-        <p:style>
-          <a:lnRef idx="2">
-            <a:schemeClr val="accent6"/>
-          </a:lnRef>
-          <a:fillRef idx="1">
-            <a:schemeClr val="lt1"/>
-          </a:fillRef>
-          <a:effectRef idx="0">
-            <a:schemeClr val="accent6"/>
-          </a:effectRef>
-          <a:fontRef idx="minor">
-            <a:schemeClr val="dk1"/>
-          </a:fontRef>
-        </p:style>
-        <p:txBody>
-          <a:bodyPr rtlCol="0" anchor="ctr"/>
-          <a:lstStyle/>
-          <a:p>
-            <a:pPr algn="ctr"/>
-            <a:r>
-              <a:rPr lang="en-US" altLang="ko-KR" dirty="0" err="1"/>
-              <a:t>RecommendList</a:t>
+              <a:t>MyList</a:t>
             </a:r>
             <a:endParaRPr lang="ko-KR" altLang="en-US" dirty="0"/>
           </a:p>
@@ -6966,29 +6615,29 @@
       </p:sp>
       <p:cxnSp>
         <p:nvCxnSpPr>
-          <p:cNvPr id="22" name="직선 화살표 연결선 21">
-            <a:extLst>
-              <a:ext uri="{FF2B5EF4-FFF2-40B4-BE49-F238E27FC236}">
-                <a16:creationId xmlns:a16="http://schemas.microsoft.com/office/drawing/2014/main" id="{4ED7B244-A07D-4C7E-BE09-28CCBCEF21B7}"/>
+          <p:cNvPr id="25" name="직선 화살표 연결선 24">
+            <a:extLst>
+              <a:ext uri="{FF2B5EF4-FFF2-40B4-BE49-F238E27FC236}">
+                <a16:creationId xmlns:a16="http://schemas.microsoft.com/office/drawing/2014/main" id="{AE7AC390-DF08-4CA3-98D7-327426C694B9}"/>
               </a:ext>
             </a:extLst>
           </p:cNvPr>
           <p:cNvCxnSpPr>
             <a:cxnSpLocks/>
-            <a:stCxn id="21" idx="0"/>
+            <a:stCxn id="24" idx="0"/>
             <a:endCxn id="19" idx="2"/>
           </p:cNvCxnSpPr>
           <p:nvPr/>
         </p:nvCxnSpPr>
         <p:spPr>
-          <a:xfrm flipH="1" flipV="1">
-            <a:off x="7136825" y="4398858"/>
-            <a:ext cx="774751" cy="804141"/>
+          <a:xfrm flipV="1">
+            <a:off x="6352640" y="4398858"/>
+            <a:ext cx="784185" cy="803564"/>
           </a:xfrm>
           <a:prstGeom prst="straightConnector1">
             <a:avLst/>
           </a:prstGeom>
-          <a:ln w="19050">
+          <a:ln w="28575">
             <a:tailEnd type="triangle"/>
           </a:ln>
         </p:spPr>
@@ -7009,10 +6658,10 @@
       </p:cxnSp>
       <p:sp>
         <p:nvSpPr>
-          <p:cNvPr id="23" name="TextBox 22">
-            <a:extLst>
-              <a:ext uri="{FF2B5EF4-FFF2-40B4-BE49-F238E27FC236}">
-                <a16:creationId xmlns:a16="http://schemas.microsoft.com/office/drawing/2014/main" id="{8C16362F-E032-4316-B05D-24453C3C1A72}"/>
+          <p:cNvPr id="26" name="TextBox 25">
+            <a:extLst>
+              <a:ext uri="{FF2B5EF4-FFF2-40B4-BE49-F238E27FC236}">
+                <a16:creationId xmlns:a16="http://schemas.microsoft.com/office/drawing/2014/main" id="{81797E4B-43DE-45A5-89CE-02D00E35A892}"/>
               </a:ext>
             </a:extLst>
           </p:cNvPr>
@@ -7021,7 +6670,7 @@
         </p:nvSpPr>
         <p:spPr>
           <a:xfrm>
-            <a:off x="7780301" y="4656899"/>
+            <a:off x="5860344" y="4623747"/>
             <a:ext cx="646331" cy="369332"/>
           </a:xfrm>
           <a:prstGeom prst="rect">
@@ -7042,218 +6691,6 @@
           </a:p>
         </p:txBody>
       </p:sp>
-      <p:sp>
-        <p:nvSpPr>
-          <p:cNvPr id="24" name="직사각형 23">
-            <a:extLst>
-              <a:ext uri="{FF2B5EF4-FFF2-40B4-BE49-F238E27FC236}">
-                <a16:creationId xmlns:a16="http://schemas.microsoft.com/office/drawing/2014/main" id="{4C8EA998-94D7-4FEB-A498-73642C5BE5A6}"/>
-              </a:ext>
-            </a:extLst>
-          </p:cNvPr>
-          <p:cNvSpPr/>
-          <p:nvPr/>
-        </p:nvSpPr>
-        <p:spPr>
-          <a:xfrm>
-            <a:off x="5753431" y="5202422"/>
-            <a:ext cx="1198417" cy="546100"/>
-          </a:xfrm>
-          <a:prstGeom prst="rect">
-            <a:avLst/>
-          </a:prstGeom>
-        </p:spPr>
-        <p:style>
-          <a:lnRef idx="2">
-            <a:schemeClr val="accent6"/>
-          </a:lnRef>
-          <a:fillRef idx="1">
-            <a:schemeClr val="lt1"/>
-          </a:fillRef>
-          <a:effectRef idx="0">
-            <a:schemeClr val="accent6"/>
-          </a:effectRef>
-          <a:fontRef idx="minor">
-            <a:schemeClr val="dk1"/>
-          </a:fontRef>
-        </p:style>
-        <p:txBody>
-          <a:bodyPr rtlCol="0" anchor="ctr"/>
-          <a:lstStyle/>
-          <a:p>
-            <a:pPr algn="ctr"/>
-            <a:r>
-              <a:rPr lang="en-US" altLang="ko-KR" dirty="0" err="1"/>
-              <a:t>MyList</a:t>
-            </a:r>
-            <a:endParaRPr lang="ko-KR" altLang="en-US" dirty="0"/>
-          </a:p>
-        </p:txBody>
-      </p:sp>
-      <p:cxnSp>
-        <p:nvCxnSpPr>
-          <p:cNvPr id="25" name="직선 화살표 연결선 24">
-            <a:extLst>
-              <a:ext uri="{FF2B5EF4-FFF2-40B4-BE49-F238E27FC236}">
-                <a16:creationId xmlns:a16="http://schemas.microsoft.com/office/drawing/2014/main" id="{AE7AC390-DF08-4CA3-98D7-327426C694B9}"/>
-              </a:ext>
-            </a:extLst>
-          </p:cNvPr>
-          <p:cNvCxnSpPr>
-            <a:cxnSpLocks/>
-            <a:stCxn id="24" idx="0"/>
-            <a:endCxn id="19" idx="2"/>
-          </p:cNvCxnSpPr>
-          <p:nvPr/>
-        </p:nvCxnSpPr>
-        <p:spPr>
-          <a:xfrm flipV="1">
-            <a:off x="6352640" y="4398858"/>
-            <a:ext cx="784185" cy="803564"/>
-          </a:xfrm>
-          <a:prstGeom prst="straightConnector1">
-            <a:avLst/>
-          </a:prstGeom>
-          <a:ln w="19050">
-            <a:tailEnd type="triangle"/>
-          </a:ln>
-        </p:spPr>
-        <p:style>
-          <a:lnRef idx="1">
-            <a:schemeClr val="accent1"/>
-          </a:lnRef>
-          <a:fillRef idx="0">
-            <a:schemeClr val="accent1"/>
-          </a:fillRef>
-          <a:effectRef idx="0">
-            <a:schemeClr val="accent1"/>
-          </a:effectRef>
-          <a:fontRef idx="minor">
-            <a:schemeClr val="tx1"/>
-          </a:fontRef>
-        </p:style>
-      </p:cxnSp>
-      <p:sp>
-        <p:nvSpPr>
-          <p:cNvPr id="26" name="TextBox 25">
-            <a:extLst>
-              <a:ext uri="{FF2B5EF4-FFF2-40B4-BE49-F238E27FC236}">
-                <a16:creationId xmlns:a16="http://schemas.microsoft.com/office/drawing/2014/main" id="{81797E4B-43DE-45A5-89CE-02D00E35A892}"/>
-              </a:ext>
-            </a:extLst>
-          </p:cNvPr>
-          <p:cNvSpPr txBox="1"/>
-          <p:nvPr/>
-        </p:nvSpPr>
-        <p:spPr>
-          <a:xfrm>
-            <a:off x="5860344" y="4623747"/>
-            <a:ext cx="646331" cy="369332"/>
-          </a:xfrm>
-          <a:prstGeom prst="rect">
-            <a:avLst/>
-          </a:prstGeom>
-          <a:noFill/>
-        </p:spPr>
-        <p:txBody>
-          <a:bodyPr wrap="none" rtlCol="0">
-            <a:spAutoFit/>
-          </a:bodyPr>
-          <a:lstStyle/>
-          <a:p>
-            <a:r>
-              <a:rPr lang="ko-KR" altLang="en-US" dirty="0"/>
-              <a:t>상속</a:t>
-            </a:r>
-          </a:p>
-        </p:txBody>
-      </p:sp>
-      <p:cxnSp>
-        <p:nvCxnSpPr>
-          <p:cNvPr id="30" name="직선 화살표 연결선 29">
-            <a:extLst>
-              <a:ext uri="{FF2B5EF4-FFF2-40B4-BE49-F238E27FC236}">
-                <a16:creationId xmlns:a16="http://schemas.microsoft.com/office/drawing/2014/main" id="{6C86B6A3-6E9D-429C-8378-EDD8A6E6E11B}"/>
-              </a:ext>
-            </a:extLst>
-          </p:cNvPr>
-          <p:cNvCxnSpPr>
-            <a:cxnSpLocks/>
-            <a:stCxn id="6" idx="0"/>
-            <a:endCxn id="7" idx="2"/>
-          </p:cNvCxnSpPr>
-          <p:nvPr/>
-        </p:nvCxnSpPr>
-        <p:spPr>
-          <a:xfrm flipH="1" flipV="1">
-            <a:off x="6197025" y="1598761"/>
-            <a:ext cx="939800" cy="783357"/>
-          </a:xfrm>
-          <a:prstGeom prst="straightConnector1">
-            <a:avLst/>
-          </a:prstGeom>
-          <a:ln w="19050">
-            <a:tailEnd type="triangle"/>
-          </a:ln>
-        </p:spPr>
-        <p:style>
-          <a:lnRef idx="1">
-            <a:schemeClr val="accent1"/>
-          </a:lnRef>
-          <a:fillRef idx="0">
-            <a:schemeClr val="accent1"/>
-          </a:fillRef>
-          <a:effectRef idx="0">
-            <a:schemeClr val="accent1"/>
-          </a:effectRef>
-          <a:fontRef idx="minor">
-            <a:schemeClr val="tx1"/>
-          </a:fontRef>
-        </p:style>
-      </p:cxnSp>
-      <p:cxnSp>
-        <p:nvCxnSpPr>
-          <p:cNvPr id="33" name="직선 화살표 연결선 32">
-            <a:extLst>
-              <a:ext uri="{FF2B5EF4-FFF2-40B4-BE49-F238E27FC236}">
-                <a16:creationId xmlns:a16="http://schemas.microsoft.com/office/drawing/2014/main" id="{B3BD8B92-2439-408F-BE73-5BC353157E8E}"/>
-              </a:ext>
-            </a:extLst>
-          </p:cNvPr>
-          <p:cNvCxnSpPr>
-            <a:cxnSpLocks/>
-            <a:stCxn id="6" idx="0"/>
-            <a:endCxn id="8" idx="2"/>
-          </p:cNvCxnSpPr>
-          <p:nvPr/>
-        </p:nvCxnSpPr>
-        <p:spPr>
-          <a:xfrm flipV="1">
-            <a:off x="7136825" y="1596136"/>
-            <a:ext cx="1083816" cy="785982"/>
-          </a:xfrm>
-          <a:prstGeom prst="straightConnector1">
-            <a:avLst/>
-          </a:prstGeom>
-          <a:ln w="19050">
-            <a:tailEnd type="triangle"/>
-          </a:ln>
-        </p:spPr>
-        <p:style>
-          <a:lnRef idx="1">
-            <a:schemeClr val="accent1"/>
-          </a:lnRef>
-          <a:fillRef idx="0">
-            <a:schemeClr val="accent1"/>
-          </a:fillRef>
-          <a:effectRef idx="0">
-            <a:schemeClr val="accent1"/>
-          </a:effectRef>
-          <a:fontRef idx="minor">
-            <a:schemeClr val="tx1"/>
-          </a:fontRef>
-        </p:style>
-      </p:cxnSp>
       <p:cxnSp>
         <p:nvCxnSpPr>
           <p:cNvPr id="37" name="직선 화살표 연결선 36">
@@ -7278,7 +6715,7 @@
           <a:prstGeom prst="straightConnector1">
             <a:avLst/>
           </a:prstGeom>
-          <a:ln w="19050">
+          <a:ln w="28575">
             <a:tailEnd type="triangle"/>
           </a:ln>
         </p:spPr>
@@ -7494,6 +6931,69 @@
           </a:fontRef>
         </p:style>
       </p:cxnSp>
+      <p:sp>
+        <p:nvSpPr>
+          <p:cNvPr id="2" name="TextBox 1">
+            <a:extLst>
+              <a:ext uri="{FF2B5EF4-FFF2-40B4-BE49-F238E27FC236}">
+                <a16:creationId xmlns:a16="http://schemas.microsoft.com/office/drawing/2014/main" id="{D2246DB3-F328-41D1-94F0-868DB33442F5}"/>
+              </a:ext>
+            </a:extLst>
+          </p:cNvPr>
+          <p:cNvSpPr txBox="1"/>
+          <p:nvPr/>
+        </p:nvSpPr>
+        <p:spPr>
+          <a:xfrm>
+            <a:off x="3601491" y="1116344"/>
+            <a:ext cx="6981398" cy="369332"/>
+          </a:xfrm>
+          <a:prstGeom prst="rect">
+            <a:avLst/>
+          </a:prstGeom>
+          <a:noFill/>
+        </p:spPr>
+        <p:txBody>
+          <a:bodyPr wrap="none" rtlCol="0">
+            <a:spAutoFit/>
+          </a:bodyPr>
+          <a:lstStyle/>
+          <a:p>
+            <a:r>
+              <a:rPr lang="ko-KR" altLang="en-US" dirty="0" err="1">
+                <a:solidFill>
+                  <a:srgbClr val="FF0000"/>
+                </a:solidFill>
+              </a:rPr>
+              <a:t>키즈모드와</a:t>
+            </a:r>
+            <a:r>
+              <a:rPr lang="ko-KR" altLang="en-US" dirty="0">
+                <a:solidFill>
+                  <a:srgbClr val="FF0000"/>
+                </a:solidFill>
+              </a:rPr>
+              <a:t> 성인모드에 따른 영상목록 출력</a:t>
+            </a:r>
+            <a:r>
+              <a:rPr lang="en-US" altLang="ko-KR" dirty="0">
+                <a:solidFill>
+                  <a:srgbClr val="FF0000"/>
+                </a:solidFill>
+              </a:rPr>
+              <a:t>: 19</a:t>
+            </a:r>
+            <a:r>
+              <a:rPr lang="ko-KR" altLang="en-US" dirty="0">
+                <a:solidFill>
+                  <a:srgbClr val="FF0000"/>
+                </a:solidFill>
+              </a:rPr>
+              <a:t>금시청시 비번입력</a:t>
+            </a:r>
+          </a:p>
+        </p:txBody>
+      </p:sp>
     </p:spTree>
     <p:extLst>
       <p:ext uri="{BB962C8B-B14F-4D97-AF65-F5344CB8AC3E}">
@@ -7644,7 +7144,7 @@
           <a:prstGeom prst="straightConnector1">
             <a:avLst/>
           </a:prstGeom>
-          <a:ln w="19050">
+          <a:ln w="28575">
             <a:tailEnd type="triangle"/>
           </a:ln>
         </p:spPr>
@@ -7742,7 +7242,7 @@
           <a:prstGeom prst="straightConnector1">
             <a:avLst/>
           </a:prstGeom>
-          <a:ln w="19050">
+          <a:ln w="28575">
             <a:tailEnd type="triangle"/>
           </a:ln>
         </p:spPr>
@@ -7958,7 +7458,7 @@
         <p:spPr>
           <a:xfrm>
             <a:off x="468869" y="3354268"/>
-            <a:ext cx="1791731" cy="646331"/>
+            <a:ext cx="1791731" cy="923330"/>
           </a:xfrm>
           <a:prstGeom prst="rect">
             <a:avLst/>
@@ -7990,6 +7490,16 @@
             </a:r>
             <a:endParaRPr lang="en-US" altLang="ko-KR" dirty="0"/>
           </a:p>
+          <a:p>
+            <a:pPr marL="342900" indent="-342900">
+              <a:buAutoNum type="arabicPeriod"/>
+            </a:pPr>
+            <a:r>
+              <a:rPr lang="ko-KR" altLang="en-US" dirty="0"/>
+              <a:t>로그아웃</a:t>
+            </a:r>
+            <a:endParaRPr lang="en-US" altLang="ko-KR" dirty="0"/>
+          </a:p>
         </p:txBody>
       </p:sp>
       <p:sp>
@@ -8041,7 +7551,7 @@
         </p:nvSpPr>
         <p:spPr>
           <a:xfrm>
-            <a:off x="468869" y="4656772"/>
+            <a:off x="468869" y="4801915"/>
             <a:ext cx="1791731" cy="1477328"/>
           </a:xfrm>
           <a:prstGeom prst="rect">
@@ -8090,7 +7600,7 @@
             </a:pPr>
             <a:r>
               <a:rPr lang="ko-KR" altLang="en-US" dirty="0"/>
-              <a:t>영상시청</a:t>
+              <a:t>환경설정</a:t>
             </a:r>
             <a:endParaRPr lang="en-US" altLang="ko-KR" dirty="0"/>
           </a:p>
@@ -8100,7 +7610,7 @@
             </a:pPr>
             <a:r>
               <a:rPr lang="ko-KR" altLang="en-US" dirty="0"/>
-              <a:t>환경설정</a:t>
+              <a:t>로그아웃</a:t>
             </a:r>
             <a:endParaRPr lang="en-US" altLang="ko-KR" dirty="0"/>
           </a:p>
@@ -8120,7 +7630,7 @@
         </p:nvSpPr>
         <p:spPr>
           <a:xfrm>
-            <a:off x="468869" y="4287440"/>
+            <a:off x="468869" y="4432583"/>
             <a:ext cx="1338828" cy="369332"/>
           </a:xfrm>
           <a:prstGeom prst="rect">
@@ -8155,8 +7665,8 @@
         </p:nvSpPr>
         <p:spPr>
           <a:xfrm>
-            <a:off x="2412399" y="3499624"/>
-            <a:ext cx="1879600" cy="923330"/>
+            <a:off x="2339828" y="3499624"/>
+            <a:ext cx="1879600" cy="1200329"/>
           </a:xfrm>
           <a:prstGeom prst="rect">
             <a:avLst/>
@@ -8198,6 +7708,16 @@
             </a:r>
             <a:endParaRPr lang="en-US" altLang="ko-KR" dirty="0"/>
           </a:p>
+          <a:p>
+            <a:pPr marL="342900" indent="-342900">
+              <a:buAutoNum type="arabicPeriod"/>
+            </a:pPr>
+            <a:r>
+              <a:rPr lang="ko-KR" altLang="en-US" dirty="0" err="1"/>
+              <a:t>뒤로가기</a:t>
+            </a:r>
+            <a:endParaRPr lang="en-US" altLang="ko-KR" dirty="0"/>
+          </a:p>
         </p:txBody>
       </p:sp>
       <p:sp>
@@ -8214,7 +7734,7 @@
         </p:nvSpPr>
         <p:spPr>
           <a:xfrm>
-            <a:off x="2412399" y="3130292"/>
+            <a:off x="2339828" y="3130292"/>
             <a:ext cx="1569660" cy="369332"/>
           </a:xfrm>
           <a:prstGeom prst="rect">
@@ -8249,8 +7769,8 @@
         </p:nvSpPr>
         <p:spPr>
           <a:xfrm>
-            <a:off x="2387600" y="5088572"/>
-            <a:ext cx="1879600" cy="646331"/>
+            <a:off x="2315029" y="5088572"/>
+            <a:ext cx="1879600" cy="1477328"/>
           </a:xfrm>
           <a:prstGeom prst="rect">
             <a:avLst/>
@@ -8282,6 +7802,60 @@
             </a:r>
             <a:endParaRPr lang="en-US" altLang="ko-KR" dirty="0"/>
           </a:p>
+          <a:p>
+            <a:pPr marL="342900" indent="-342900">
+              <a:buAutoNum type="arabicPeriod"/>
+            </a:pPr>
+            <a:r>
+              <a:rPr lang="ko-KR" altLang="en-US" dirty="0">
+                <a:solidFill>
+                  <a:srgbClr val="FF0000"/>
+                </a:solidFill>
+              </a:rPr>
+              <a:t>영상시청</a:t>
+            </a:r>
+            <a:br>
+              <a:rPr lang="en-US" altLang="ko-KR" dirty="0">
+                <a:solidFill>
+                  <a:srgbClr val="FF0000"/>
+                </a:solidFill>
+              </a:rPr>
+            </a:br>
+            <a:r>
+              <a:rPr lang="en-US" altLang="ko-KR" dirty="0">
+                <a:solidFill>
+                  <a:srgbClr val="FF0000"/>
+                </a:solidFill>
+              </a:rPr>
+              <a:t>(19</a:t>
+            </a:r>
+            <a:r>
+              <a:rPr lang="ko-KR" altLang="en-US" dirty="0">
+                <a:solidFill>
+                  <a:srgbClr val="FF0000"/>
+                </a:solidFill>
+              </a:rPr>
+              <a:t>금시비번</a:t>
+            </a:r>
+            <a:r>
+              <a:rPr lang="en-US" altLang="ko-KR" dirty="0">
+                <a:solidFill>
+                  <a:srgbClr val="FF0000"/>
+                </a:solidFill>
+              </a:rPr>
+              <a:t>)</a:t>
+            </a:r>
+          </a:p>
+          <a:p>
+            <a:pPr marL="342900" indent="-342900">
+              <a:buAutoNum type="arabicPeriod"/>
+            </a:pPr>
+            <a:r>
+              <a:rPr lang="ko-KR" altLang="en-US" dirty="0" err="1"/>
+              <a:t>뒤로가기</a:t>
+            </a:r>
+            <a:endParaRPr lang="en-US" altLang="ko-KR" dirty="0"/>
+          </a:p>
         </p:txBody>
       </p:sp>
       <p:sp>
@@ -8298,7 +7872,7 @@
         </p:nvSpPr>
         <p:spPr>
           <a:xfrm>
-            <a:off x="2412399" y="4719240"/>
+            <a:off x="2339828" y="4719240"/>
             <a:ext cx="1569660" cy="369332"/>
           </a:xfrm>
           <a:prstGeom prst="rect">
@@ -8316,6 +7890,91 @@
               <a:rPr lang="ko-KR" altLang="en-US" dirty="0"/>
               <a:t>영상정보화면</a:t>
             </a:r>
+          </a:p>
+        </p:txBody>
+      </p:sp>
+      <p:sp>
+        <p:nvSpPr>
+          <p:cNvPr id="19" name="TextBox 18">
+            <a:extLst>
+              <a:ext uri="{FF2B5EF4-FFF2-40B4-BE49-F238E27FC236}">
+                <a16:creationId xmlns:a16="http://schemas.microsoft.com/office/drawing/2014/main" id="{62F52C8E-C736-4D83-95C3-C014711A0871}"/>
+              </a:ext>
+            </a:extLst>
+          </p:cNvPr>
+          <p:cNvSpPr txBox="1"/>
+          <p:nvPr/>
+        </p:nvSpPr>
+        <p:spPr>
+          <a:xfrm>
+            <a:off x="4306723" y="3499624"/>
+            <a:ext cx="2116097" cy="646331"/>
+          </a:xfrm>
+          <a:prstGeom prst="rect">
+            <a:avLst/>
+          </a:prstGeom>
+          <a:noFill/>
+        </p:spPr>
+        <p:txBody>
+          <a:bodyPr wrap="square" rtlCol="0">
+            <a:spAutoFit/>
+          </a:bodyPr>
+          <a:lstStyle/>
+          <a:p>
+            <a:pPr marL="342900" indent="-342900">
+              <a:buAutoNum type="arabicPeriod"/>
+            </a:pPr>
+            <a:r>
+              <a:rPr lang="ko-KR" altLang="en-US" dirty="0"/>
+              <a:t>로그인</a:t>
+            </a:r>
+            <a:endParaRPr lang="en-US" altLang="ko-KR" dirty="0"/>
+          </a:p>
+          <a:p>
+            <a:pPr marL="342900" indent="-342900">
+              <a:buAutoNum type="arabicPeriod"/>
+            </a:pPr>
+            <a:r>
+              <a:rPr lang="ko-KR" altLang="en-US" dirty="0"/>
+              <a:t>프로그램종료</a:t>
+            </a:r>
+            <a:endParaRPr lang="en-US" altLang="ko-KR" dirty="0"/>
+          </a:p>
+        </p:txBody>
+      </p:sp>
+      <p:sp>
+        <p:nvSpPr>
+          <p:cNvPr id="20" name="TextBox 19">
+            <a:extLst>
+              <a:ext uri="{FF2B5EF4-FFF2-40B4-BE49-F238E27FC236}">
+                <a16:creationId xmlns:a16="http://schemas.microsoft.com/office/drawing/2014/main" id="{05E86E40-F1ED-443C-A02C-7F8EDA8DB0BA}"/>
+              </a:ext>
+            </a:extLst>
+          </p:cNvPr>
+          <p:cNvSpPr txBox="1"/>
+          <p:nvPr/>
+        </p:nvSpPr>
+        <p:spPr>
+          <a:xfrm>
+            <a:off x="4306723" y="3130292"/>
+            <a:ext cx="1338828" cy="369332"/>
+          </a:xfrm>
+          <a:prstGeom prst="rect">
+            <a:avLst/>
+          </a:prstGeom>
+          <a:noFill/>
+        </p:spPr>
+        <p:txBody>
+          <a:bodyPr wrap="none" rtlCol="0">
+            <a:spAutoFit/>
+          </a:bodyPr>
+          <a:lstStyle/>
+          <a:p>
+            <a:r>
+              <a:rPr lang="ko-KR" altLang="en-US" dirty="0" err="1"/>
+              <a:t>로그인화면</a:t>
+            </a:r>
+            <a:endParaRPr lang="ko-KR" altLang="en-US" dirty="0"/>
           </a:p>
         </p:txBody>
       </p:sp>

</xml_diff>